<commit_message>
Working on the formatting
Fixing formatting on slide decks, adapted color schemes to match the Under the Hood presentation.

Re-made the Shared Memory diagram.
</commit_message>
<xml_diff>
--- a/Trunk/Getting Started Material/DCAF Training/4 Designing an application with DCAF.pptx
+++ b/Trunk/Getting Started Material/DCAF Training/4 Designing an application with DCAF.pptx
@@ -213,7 +213,7 @@
           <a:p>
             <a:fld id="{03CB5878-D5AF-4D91-A4DD-D6DE7AC90AEE}" type="datetimeFigureOut">
               <a:rPr lang="en-US" smtClean="0"/>
-              <a:t>2018-06-27</a:t>
+              <a:t>2018-07-03</a:t>
             </a:fld>
             <a:endParaRPr lang="en-US"/>
           </a:p>
@@ -4051,7 +4051,7 @@
           <a:p>
             <a:fld id="{8BEBFB54-DD62-4FD2-AABF-1CC163250B3B}" type="datetimeFigureOut">
               <a:rPr lang="en-US" smtClean="0"/>
-              <a:t>2018-06-27</a:t>
+              <a:t>2018-07-03</a:t>
             </a:fld>
             <a:endParaRPr lang="en-US"/>
           </a:p>
@@ -7922,7 +7922,9 @@
             <a:avLst/>
           </a:prstGeom>
           <a:solidFill>
-            <a:srgbClr val="C00000"/>
+            <a:schemeClr val="tx2">
+              <a:lumMod val="50000"/>
+            </a:schemeClr>
           </a:solidFill>
           <a:ln w="28575">
             <a:solidFill>
@@ -7984,7 +7986,9 @@
             <a:avLst/>
           </a:prstGeom>
           <a:solidFill>
-            <a:srgbClr val="C00000"/>
+            <a:schemeClr val="accent6">
+              <a:lumMod val="75000"/>
+            </a:schemeClr>
           </a:solidFill>
           <a:ln w="28575">
             <a:solidFill>
@@ -8046,7 +8050,9 @@
             <a:avLst/>
           </a:prstGeom>
           <a:solidFill>
-            <a:srgbClr val="C00000"/>
+            <a:schemeClr val="tx2">
+              <a:lumMod val="50000"/>
+            </a:schemeClr>
           </a:solidFill>
           <a:ln w="28575">
             <a:solidFill>
@@ -8108,7 +8114,7 @@
             <a:avLst/>
           </a:prstGeom>
           <a:solidFill>
-            <a:srgbClr val="007200"/>
+            <a:srgbClr val="C00000"/>
           </a:solidFill>
           <a:ln w="28575">
             <a:solidFill>
@@ -9262,6 +9268,67 @@
       </p:grpSpPr>
       <p:sp>
         <p:nvSpPr>
+          <p:cNvPr id="29" name="Rounded Rectangle 6">
+            <a:extLst>
+              <a:ext uri="{FF2B5EF4-FFF2-40B4-BE49-F238E27FC236}">
+                <a16:creationId xmlns:a16="http://schemas.microsoft.com/office/drawing/2014/main" id="{9895420F-0717-4E72-9B0E-BED9012CF041}"/>
+              </a:ext>
+            </a:extLst>
+          </p:cNvPr>
+          <p:cNvSpPr/>
+          <p:nvPr/>
+        </p:nvSpPr>
+        <p:spPr>
+          <a:xfrm>
+            <a:off x="5832247" y="1099634"/>
+            <a:ext cx="2320066" cy="4735769"/>
+          </a:xfrm>
+          <a:prstGeom prst="roundRect">
+            <a:avLst/>
+          </a:prstGeom>
+          <a:solidFill>
+            <a:schemeClr val="bg1">
+              <a:lumMod val="85000"/>
+            </a:schemeClr>
+          </a:solidFill>
+          <a:ln w="28575">
+            <a:solidFill>
+              <a:schemeClr val="tx1"/>
+            </a:solidFill>
+          </a:ln>
+          <a:effectLst>
+            <a:outerShdw blurRad="50800" dist="38100" dir="2700000" algn="tl" rotWithShape="0">
+              <a:prstClr val="black">
+                <a:alpha val="40000"/>
+              </a:prstClr>
+            </a:outerShdw>
+          </a:effectLst>
+        </p:spPr>
+        <p:style>
+          <a:lnRef idx="1">
+            <a:schemeClr val="accent1"/>
+          </a:lnRef>
+          <a:fillRef idx="3">
+            <a:schemeClr val="accent1"/>
+          </a:fillRef>
+          <a:effectRef idx="2">
+            <a:schemeClr val="accent1"/>
+          </a:effectRef>
+          <a:fontRef idx="minor">
+            <a:schemeClr val="lt1"/>
+          </a:fontRef>
+        </p:style>
+        <p:txBody>
+          <a:bodyPr rtlCol="0" anchor="ctr"/>
+          <a:lstStyle/>
+          <a:p>
+            <a:pPr algn="ctr"/>
+            <a:endParaRPr lang="en-US" dirty="0"/>
+          </a:p>
+        </p:txBody>
+      </p:sp>
+      <p:sp>
+        <p:nvSpPr>
           <p:cNvPr id="2" name="Title 1">
             <a:extLst>
               <a:ext uri="{FF2B5EF4-FFF2-40B4-BE49-F238E27FC236}">
@@ -9288,74 +9355,1286 @@
           </a:p>
         </p:txBody>
       </p:sp>
-      <p:pic>
-        <p:nvPicPr>
-          <p:cNvPr id="3074" name="Picture 2" descr="http://www.ni.com/cms/images/devzone/tut/DCAF_scan_interface.jpg">
+      <p:sp>
+        <p:nvSpPr>
+          <p:cNvPr id="7" name="Rounded Rectangle 3">
             <a:extLst>
               <a:ext uri="{FF2B5EF4-FFF2-40B4-BE49-F238E27FC236}">
-                <a16:creationId xmlns:a16="http://schemas.microsoft.com/office/drawing/2014/main" id="{14198C1A-74D4-4147-B1A7-6C385BE8ADF9}"/>
+                <a16:creationId xmlns:a16="http://schemas.microsoft.com/office/drawing/2014/main" id="{E6BB9B82-E565-41CB-B677-6042766064CC}"/>
               </a:ext>
             </a:extLst>
           </p:cNvPr>
-          <p:cNvPicPr>
-            <a:picLocks noGrp="1" noChangeAspect="1" noChangeArrowheads="1"/>
-          </p:cNvPicPr>
-          <p:nvPr>
-            <p:ph sz="half" idx="1"/>
-          </p:nvPr>
-        </p:nvPicPr>
-        <p:blipFill>
-          <a:blip r:embed="rId2">
-            <a:extLst>
-              <a:ext uri="{28A0092B-C50C-407E-A947-70E740481C1C}">
-                <a14:useLocalDpi xmlns:a14="http://schemas.microsoft.com/office/drawing/2010/main" val="0"/>
-              </a:ext>
-            </a:extLst>
-          </a:blip>
-          <a:stretch>
-            <a:fillRect/>
-          </a:stretch>
-        </p:blipFill>
-        <p:spPr bwMode="auto">
-          <a:xfrm>
-            <a:off x="254301" y="2220687"/>
-            <a:ext cx="5841699" cy="3251824"/>
-          </a:xfrm>
-          <a:prstGeom prst="rect">
-            <a:avLst/>
-          </a:prstGeom>
-          <a:noFill/>
-          <a:extLst>
-            <a:ext uri="{909E8E84-426E-40DD-AFC4-6F175D3DCCD1}">
-              <a14:hiddenFill xmlns:a14="http://schemas.microsoft.com/office/drawing/2010/main">
-                <a:solidFill>
-                  <a:srgbClr val="FFFFFF"/>
-                </a:solidFill>
-              </a14:hiddenFill>
-            </a:ext>
-          </a:extLst>
-        </p:spPr>
-      </p:pic>
-      <p:sp>
-        <p:nvSpPr>
-          <p:cNvPr id="4" name="Content Placeholder 3">
+          <p:cNvSpPr/>
+          <p:nvPr/>
+        </p:nvSpPr>
+        <p:spPr>
+          <a:xfrm>
+            <a:off x="8785646" y="4756189"/>
+            <a:ext cx="1828800" cy="771787"/>
+          </a:xfrm>
+          <a:prstGeom prst="roundRect">
+            <a:avLst/>
+          </a:prstGeom>
+          <a:solidFill>
+            <a:schemeClr val="tx2">
+              <a:lumMod val="50000"/>
+            </a:schemeClr>
+          </a:solidFill>
+          <a:ln w="28575">
+            <a:solidFill>
+              <a:schemeClr val="tx1"/>
+            </a:solidFill>
+          </a:ln>
+          <a:effectLst>
+            <a:outerShdw blurRad="50800" dist="38100" dir="2700000" algn="tl" rotWithShape="0">
+              <a:prstClr val="black">
+                <a:alpha val="40000"/>
+              </a:prstClr>
+            </a:outerShdw>
+          </a:effectLst>
+        </p:spPr>
+        <p:style>
+          <a:lnRef idx="1">
+            <a:schemeClr val="accent1"/>
+          </a:lnRef>
+          <a:fillRef idx="3">
+            <a:schemeClr val="accent1"/>
+          </a:fillRef>
+          <a:effectRef idx="2">
+            <a:schemeClr val="accent1"/>
+          </a:effectRef>
+          <a:fontRef idx="minor">
+            <a:schemeClr val="lt1"/>
+          </a:fontRef>
+        </p:style>
+        <p:txBody>
+          <a:bodyPr rtlCol="0" anchor="ctr"/>
+          <a:lstStyle/>
+          <a:p>
+            <a:pPr algn="ctr"/>
+            <a:r>
+              <a:rPr lang="en-US" dirty="0"/>
+              <a:t>I/O</a:t>
+            </a:r>
+          </a:p>
+        </p:txBody>
+      </p:sp>
+      <p:sp>
+        <p:nvSpPr>
+          <p:cNvPr id="13" name="Rounded Rectangle 6">
             <a:extLst>
               <a:ext uri="{FF2B5EF4-FFF2-40B4-BE49-F238E27FC236}">
-                <a16:creationId xmlns:a16="http://schemas.microsoft.com/office/drawing/2014/main" id="{8AD0E338-24A1-403E-BD5A-03283ED27684}"/>
+                <a16:creationId xmlns:a16="http://schemas.microsoft.com/office/drawing/2014/main" id="{0F53775A-E950-4A7C-8709-54A18E7D6106}"/>
               </a:ext>
             </a:extLst>
           </p:cNvPr>
-          <p:cNvSpPr>
-            <a:spLocks noGrp="1"/>
+          <p:cNvSpPr/>
+          <p:nvPr/>
+        </p:nvSpPr>
+        <p:spPr>
+          <a:xfrm>
+            <a:off x="181946" y="1099635"/>
+            <a:ext cx="3949958" cy="4735769"/>
+          </a:xfrm>
+          <a:prstGeom prst="roundRect">
+            <a:avLst/>
+          </a:prstGeom>
+          <a:solidFill>
+            <a:schemeClr val="bg1">
+              <a:lumMod val="85000"/>
+            </a:schemeClr>
+          </a:solidFill>
+          <a:ln w="28575">
+            <a:solidFill>
+              <a:schemeClr val="tx1"/>
+            </a:solidFill>
+          </a:ln>
+          <a:effectLst>
+            <a:outerShdw blurRad="50800" dist="38100" dir="2700000" algn="tl" rotWithShape="0">
+              <a:prstClr val="black">
+                <a:alpha val="40000"/>
+              </a:prstClr>
+            </a:outerShdw>
+          </a:effectLst>
+        </p:spPr>
+        <p:style>
+          <a:lnRef idx="1">
+            <a:schemeClr val="accent1"/>
+          </a:lnRef>
+          <a:fillRef idx="3">
+            <a:schemeClr val="accent1"/>
+          </a:fillRef>
+          <a:effectRef idx="2">
+            <a:schemeClr val="accent1"/>
+          </a:effectRef>
+          <a:fontRef idx="minor">
+            <a:schemeClr val="lt1"/>
+          </a:fontRef>
+        </p:style>
+        <p:txBody>
+          <a:bodyPr rtlCol="0" anchor="ctr"/>
+          <a:lstStyle/>
+          <a:p>
+            <a:pPr algn="ctr"/>
+            <a:endParaRPr lang="en-US" dirty="0"/>
+          </a:p>
+        </p:txBody>
+      </p:sp>
+      <p:sp>
+        <p:nvSpPr>
+          <p:cNvPr id="14" name="Rounded Rectangle 6">
+            <a:extLst>
+              <a:ext uri="{FF2B5EF4-FFF2-40B4-BE49-F238E27FC236}">
+                <a16:creationId xmlns:a16="http://schemas.microsoft.com/office/drawing/2014/main" id="{5618E771-9DCE-4E67-9186-E71632A26A98}"/>
+              </a:ext>
+            </a:extLst>
+          </p:cNvPr>
+          <p:cNvSpPr/>
+          <p:nvPr/>
+        </p:nvSpPr>
+        <p:spPr>
+          <a:xfrm>
+            <a:off x="367275" y="1809006"/>
+            <a:ext cx="1646659" cy="771787"/>
+          </a:xfrm>
+          <a:prstGeom prst="roundRect">
+            <a:avLst/>
+          </a:prstGeom>
+          <a:solidFill>
+            <a:schemeClr val="bg2">
+              <a:lumMod val="50000"/>
+            </a:schemeClr>
+          </a:solidFill>
+          <a:ln w="28575">
+            <a:solidFill>
+              <a:schemeClr val="tx1"/>
+            </a:solidFill>
+          </a:ln>
+          <a:effectLst>
+            <a:outerShdw blurRad="50800" dist="38100" dir="2700000" algn="tl" rotWithShape="0">
+              <a:prstClr val="black">
+                <a:alpha val="40000"/>
+              </a:prstClr>
+            </a:outerShdw>
+          </a:effectLst>
+        </p:spPr>
+        <p:style>
+          <a:lnRef idx="1">
+            <a:schemeClr val="accent1"/>
+          </a:lnRef>
+          <a:fillRef idx="3">
+            <a:schemeClr val="accent1"/>
+          </a:fillRef>
+          <a:effectRef idx="2">
+            <a:schemeClr val="accent1"/>
+          </a:effectRef>
+          <a:fontRef idx="minor">
+            <a:schemeClr val="lt1"/>
+          </a:fontRef>
+        </p:style>
+        <p:txBody>
+          <a:bodyPr rtlCol="0" anchor="ctr"/>
+          <a:lstStyle/>
+          <a:p>
+            <a:pPr algn="ctr"/>
+            <a:r>
+              <a:rPr lang="en-US" dirty="0"/>
+              <a:t>C/C++</a:t>
+            </a:r>
+          </a:p>
+        </p:txBody>
+      </p:sp>
+      <p:sp>
+        <p:nvSpPr>
+          <p:cNvPr id="16" name="Rounded Rectangle 6">
+            <a:extLst>
+              <a:ext uri="{FF2B5EF4-FFF2-40B4-BE49-F238E27FC236}">
+                <a16:creationId xmlns:a16="http://schemas.microsoft.com/office/drawing/2014/main" id="{E31C11E3-2ECF-448A-A631-9CD9588940CE}"/>
+              </a:ext>
+            </a:extLst>
+          </p:cNvPr>
+          <p:cNvSpPr/>
+          <p:nvPr/>
+        </p:nvSpPr>
+        <p:spPr>
+          <a:xfrm>
+            <a:off x="367275" y="3290164"/>
+            <a:ext cx="1646412" cy="771787"/>
+          </a:xfrm>
+          <a:prstGeom prst="roundRect">
+            <a:avLst/>
+          </a:prstGeom>
+          <a:solidFill>
+            <a:schemeClr val="bg1">
+              <a:lumMod val="50000"/>
+            </a:schemeClr>
+          </a:solidFill>
+          <a:ln w="28575">
+            <a:solidFill>
+              <a:schemeClr val="tx1"/>
+            </a:solidFill>
+          </a:ln>
+          <a:effectLst>
+            <a:outerShdw blurRad="50800" dist="38100" dir="2700000" algn="tl" rotWithShape="0">
+              <a:prstClr val="black">
+                <a:alpha val="40000"/>
+              </a:prstClr>
+            </a:outerShdw>
+          </a:effectLst>
+        </p:spPr>
+        <p:style>
+          <a:lnRef idx="1">
+            <a:schemeClr val="accent1"/>
+          </a:lnRef>
+          <a:fillRef idx="3">
+            <a:schemeClr val="accent1"/>
+          </a:fillRef>
+          <a:effectRef idx="2">
+            <a:schemeClr val="accent1"/>
+          </a:effectRef>
+          <a:fontRef idx="minor">
+            <a:schemeClr val="lt1"/>
+          </a:fontRef>
+        </p:style>
+        <p:txBody>
+          <a:bodyPr rtlCol="0" anchor="ctr"/>
+          <a:lstStyle/>
+          <a:p>
+            <a:pPr algn="ctr"/>
+            <a:r>
+              <a:rPr lang="en-US" dirty="0"/>
+              <a:t>Shared Memory</a:t>
+            </a:r>
+          </a:p>
+        </p:txBody>
+      </p:sp>
+      <p:sp>
+        <p:nvSpPr>
+          <p:cNvPr id="21" name="Up Arrow 21">
+            <a:extLst>
+              <a:ext uri="{FF2B5EF4-FFF2-40B4-BE49-F238E27FC236}">
+                <a16:creationId xmlns:a16="http://schemas.microsoft.com/office/drawing/2014/main" id="{08EC5600-7FA9-4AF9-B28E-5FE68A20FDD0}"/>
+              </a:ext>
+            </a:extLst>
+          </p:cNvPr>
+          <p:cNvSpPr/>
+          <p:nvPr/>
+        </p:nvSpPr>
+        <p:spPr>
+          <a:xfrm rot="10800000">
+            <a:off x="893891" y="2647731"/>
+            <a:ext cx="251671" cy="568256"/>
+          </a:xfrm>
+          <a:prstGeom prst="upArrow">
+            <a:avLst/>
+          </a:prstGeom>
+          <a:solidFill>
+            <a:schemeClr val="tx2"/>
+          </a:solidFill>
+          <a:ln>
+            <a:noFill/>
+          </a:ln>
+          <a:effectLst>
+            <a:outerShdw blurRad="50800" dist="38100" dir="2700000" algn="tl" rotWithShape="0">
+              <a:prstClr val="black">
+                <a:alpha val="40000"/>
+              </a:prstClr>
+            </a:outerShdw>
+          </a:effectLst>
+        </p:spPr>
+        <p:style>
+          <a:lnRef idx="1">
+            <a:schemeClr val="accent1"/>
+          </a:lnRef>
+          <a:fillRef idx="3">
+            <a:schemeClr val="accent1"/>
+          </a:fillRef>
+          <a:effectRef idx="2">
+            <a:schemeClr val="accent1"/>
+          </a:effectRef>
+          <a:fontRef idx="minor">
+            <a:schemeClr val="lt1"/>
+          </a:fontRef>
+        </p:style>
+        <p:txBody>
+          <a:bodyPr rtlCol="0" anchor="ctr"/>
+          <a:lstStyle/>
+          <a:p>
+            <a:pPr algn="ctr"/>
+            <a:endParaRPr lang="en-US"/>
+          </a:p>
+        </p:txBody>
+      </p:sp>
+      <p:sp>
+        <p:nvSpPr>
+          <p:cNvPr id="22" name="Up Arrow 20">
+            <a:extLst>
+              <a:ext uri="{FF2B5EF4-FFF2-40B4-BE49-F238E27FC236}">
+                <a16:creationId xmlns:a16="http://schemas.microsoft.com/office/drawing/2014/main" id="{A35760C9-61AC-4A5A-BD24-31DBE5B7E402}"/>
+              </a:ext>
+            </a:extLst>
+          </p:cNvPr>
+          <p:cNvSpPr/>
+          <p:nvPr/>
+        </p:nvSpPr>
+        <p:spPr>
+          <a:xfrm>
+            <a:off x="1321929" y="2630197"/>
+            <a:ext cx="251671" cy="597829"/>
+          </a:xfrm>
+          <a:prstGeom prst="upArrow">
+            <a:avLst/>
+          </a:prstGeom>
+          <a:solidFill>
+            <a:schemeClr val="tx2"/>
+          </a:solidFill>
+          <a:ln>
+            <a:noFill/>
+          </a:ln>
+          <a:effectLst>
+            <a:outerShdw blurRad="50800" dist="38100" dir="2700000" algn="tl" rotWithShape="0">
+              <a:prstClr val="black">
+                <a:alpha val="40000"/>
+              </a:prstClr>
+            </a:outerShdw>
+          </a:effectLst>
+        </p:spPr>
+        <p:style>
+          <a:lnRef idx="1">
+            <a:schemeClr val="accent1"/>
+          </a:lnRef>
+          <a:fillRef idx="3">
+            <a:schemeClr val="accent1"/>
+          </a:fillRef>
+          <a:effectRef idx="2">
+            <a:schemeClr val="accent1"/>
+          </a:effectRef>
+          <a:fontRef idx="minor">
+            <a:schemeClr val="lt1"/>
+          </a:fontRef>
+        </p:style>
+        <p:txBody>
+          <a:bodyPr rtlCol="0" anchor="ctr"/>
+          <a:lstStyle/>
+          <a:p>
+            <a:pPr algn="ctr"/>
+            <a:endParaRPr lang="en-US"/>
+          </a:p>
+        </p:txBody>
+      </p:sp>
+      <p:sp>
+        <p:nvSpPr>
+          <p:cNvPr id="23" name="TextBox 22">
+            <a:extLst>
+              <a:ext uri="{FF2B5EF4-FFF2-40B4-BE49-F238E27FC236}">
+                <a16:creationId xmlns:a16="http://schemas.microsoft.com/office/drawing/2014/main" id="{B2F7C82B-0D1F-498C-92D9-55E4512A0C3B}"/>
+              </a:ext>
+            </a:extLst>
+          </p:cNvPr>
+          <p:cNvSpPr txBox="1"/>
+          <p:nvPr/>
+        </p:nvSpPr>
+        <p:spPr>
+          <a:xfrm>
+            <a:off x="608972" y="1251834"/>
+            <a:ext cx="1684796" cy="523220"/>
+          </a:xfrm>
+          <a:prstGeom prst="rect">
+            <a:avLst/>
+          </a:prstGeom>
+          <a:noFill/>
+        </p:spPr>
+        <p:txBody>
+          <a:bodyPr wrap="square" lIns="0" rIns="0" rtlCol="0">
+            <a:spAutoFit/>
+          </a:bodyPr>
+          <a:lstStyle/>
+          <a:p>
+            <a:r>
+              <a:rPr lang="en-US" sz="2800" b="1" dirty="0">
+                <a:solidFill>
+                  <a:schemeClr val="bg1"/>
+                </a:solidFill>
+              </a:rPr>
+              <a:t>RT</a:t>
+            </a:r>
+          </a:p>
+        </p:txBody>
+      </p:sp>
+      <p:sp>
+        <p:nvSpPr>
+          <p:cNvPr id="24" name="Rounded Rectangle 6">
+            <a:extLst>
+              <a:ext uri="{FF2B5EF4-FFF2-40B4-BE49-F238E27FC236}">
+                <a16:creationId xmlns:a16="http://schemas.microsoft.com/office/drawing/2014/main" id="{319D76E7-4C5F-404A-A705-8B3ECE99711E}"/>
+              </a:ext>
+            </a:extLst>
+          </p:cNvPr>
+          <p:cNvSpPr/>
+          <p:nvPr/>
+        </p:nvSpPr>
+        <p:spPr>
+          <a:xfrm>
+            <a:off x="382598" y="4756233"/>
+            <a:ext cx="1668174" cy="771787"/>
+          </a:xfrm>
+          <a:prstGeom prst="roundRect">
+            <a:avLst/>
+          </a:prstGeom>
+          <a:solidFill>
+            <a:schemeClr val="bg1">
+              <a:lumMod val="50000"/>
+            </a:schemeClr>
+          </a:solidFill>
+          <a:ln w="28575">
+            <a:solidFill>
+              <a:schemeClr val="tx1"/>
+            </a:solidFill>
+          </a:ln>
+          <a:effectLst>
+            <a:outerShdw blurRad="50800" dist="38100" dir="2700000" algn="tl" rotWithShape="0">
+              <a:prstClr val="black">
+                <a:alpha val="40000"/>
+              </a:prstClr>
+            </a:outerShdw>
+          </a:effectLst>
+        </p:spPr>
+        <p:style>
+          <a:lnRef idx="1">
+            <a:schemeClr val="accent1"/>
+          </a:lnRef>
+          <a:fillRef idx="3">
+            <a:schemeClr val="accent1"/>
+          </a:fillRef>
+          <a:effectRef idx="2">
+            <a:schemeClr val="accent1"/>
+          </a:effectRef>
+          <a:fontRef idx="minor">
+            <a:schemeClr val="lt1"/>
+          </a:fontRef>
+        </p:style>
+        <p:txBody>
+          <a:bodyPr rtlCol="0" anchor="ctr"/>
+          <a:lstStyle/>
+          <a:p>
+            <a:pPr algn="ctr"/>
+            <a:r>
+              <a:rPr lang="en-US" dirty="0"/>
+              <a:t>LabVIEW (DCAF)</a:t>
+            </a:r>
+          </a:p>
+        </p:txBody>
+      </p:sp>
+      <p:sp>
+        <p:nvSpPr>
+          <p:cNvPr id="25" name="Rounded Rectangle 6">
+            <a:extLst>
+              <a:ext uri="{FF2B5EF4-FFF2-40B4-BE49-F238E27FC236}">
+                <a16:creationId xmlns:a16="http://schemas.microsoft.com/office/drawing/2014/main" id="{7BBCB0F6-26DC-4384-8149-FA06201834DD}"/>
+              </a:ext>
+            </a:extLst>
+          </p:cNvPr>
+          <p:cNvSpPr/>
+          <p:nvPr/>
+        </p:nvSpPr>
+        <p:spPr>
+          <a:xfrm>
+            <a:off x="4287688" y="1099634"/>
+            <a:ext cx="1388775" cy="4735769"/>
+          </a:xfrm>
+          <a:prstGeom prst="roundRect">
+            <a:avLst/>
+          </a:prstGeom>
+          <a:solidFill>
+            <a:schemeClr val="bg1">
+              <a:lumMod val="85000"/>
+            </a:schemeClr>
+          </a:solidFill>
+          <a:ln w="28575">
+            <a:solidFill>
+              <a:schemeClr val="tx1"/>
+            </a:solidFill>
+          </a:ln>
+          <a:effectLst>
+            <a:outerShdw blurRad="50800" dist="38100" dir="2700000" algn="tl" rotWithShape="0">
+              <a:prstClr val="black">
+                <a:alpha val="40000"/>
+              </a:prstClr>
+            </a:outerShdw>
+          </a:effectLst>
+        </p:spPr>
+        <p:style>
+          <a:lnRef idx="1">
+            <a:schemeClr val="accent1"/>
+          </a:lnRef>
+          <a:fillRef idx="3">
+            <a:schemeClr val="accent1"/>
+          </a:fillRef>
+          <a:effectRef idx="2">
+            <a:schemeClr val="accent1"/>
+          </a:effectRef>
+          <a:fontRef idx="minor">
+            <a:schemeClr val="lt1"/>
+          </a:fontRef>
+        </p:style>
+        <p:txBody>
+          <a:bodyPr rtlCol="0" anchor="ctr"/>
+          <a:lstStyle/>
+          <a:p>
+            <a:pPr algn="ctr"/>
+            <a:endParaRPr lang="en-US" dirty="0"/>
+          </a:p>
+        </p:txBody>
+      </p:sp>
+      <p:sp>
+        <p:nvSpPr>
+          <p:cNvPr id="26" name="TextBox 25">
+            <a:extLst>
+              <a:ext uri="{FF2B5EF4-FFF2-40B4-BE49-F238E27FC236}">
+                <a16:creationId xmlns:a16="http://schemas.microsoft.com/office/drawing/2014/main" id="{81D4346F-BB08-4677-B94E-FCA7D3C3B77D}"/>
+              </a:ext>
+            </a:extLst>
+          </p:cNvPr>
+          <p:cNvSpPr txBox="1"/>
+          <p:nvPr/>
+        </p:nvSpPr>
+        <p:spPr>
+          <a:xfrm>
+            <a:off x="605367" y="1250132"/>
+            <a:ext cx="1684796" cy="523220"/>
+          </a:xfrm>
+          <a:prstGeom prst="rect">
+            <a:avLst/>
+          </a:prstGeom>
+          <a:noFill/>
+        </p:spPr>
+        <p:txBody>
+          <a:bodyPr wrap="square" lIns="0" rIns="0" rtlCol="0">
+            <a:spAutoFit/>
+          </a:bodyPr>
+          <a:lstStyle/>
+          <a:p>
+            <a:r>
+              <a:rPr lang="en-US" sz="2800" b="1" dirty="0"/>
+              <a:t>RT</a:t>
+            </a:r>
+          </a:p>
+        </p:txBody>
+      </p:sp>
+      <p:sp>
+        <p:nvSpPr>
+          <p:cNvPr id="27" name="TextBox 26">
+            <a:extLst>
+              <a:ext uri="{FF2B5EF4-FFF2-40B4-BE49-F238E27FC236}">
+                <a16:creationId xmlns:a16="http://schemas.microsoft.com/office/drawing/2014/main" id="{BCE8B61B-5840-4B8C-B50B-90518F982003}"/>
+              </a:ext>
+            </a:extLst>
+          </p:cNvPr>
+          <p:cNvSpPr txBox="1"/>
+          <p:nvPr/>
+        </p:nvSpPr>
+        <p:spPr>
+          <a:xfrm>
+            <a:off x="4429802" y="1285786"/>
+            <a:ext cx="1246661" cy="523220"/>
+          </a:xfrm>
+          <a:prstGeom prst="rect">
+            <a:avLst/>
+          </a:prstGeom>
+          <a:noFill/>
+        </p:spPr>
+        <p:txBody>
+          <a:bodyPr wrap="square" lIns="0" rIns="0" rtlCol="0">
+            <a:spAutoFit/>
+          </a:bodyPr>
+          <a:lstStyle/>
+          <a:p>
+            <a:r>
+              <a:rPr lang="en-US" sz="2800" b="1" dirty="0"/>
+              <a:t>NI-RIO</a:t>
+            </a:r>
+          </a:p>
+        </p:txBody>
+      </p:sp>
+      <p:sp>
+        <p:nvSpPr>
+          <p:cNvPr id="28" name="Rounded Rectangle 6">
+            <a:extLst>
+              <a:ext uri="{FF2B5EF4-FFF2-40B4-BE49-F238E27FC236}">
+                <a16:creationId xmlns:a16="http://schemas.microsoft.com/office/drawing/2014/main" id="{0C7D9907-18E0-4625-9623-EC3BE90CA8B4}"/>
+              </a:ext>
+            </a:extLst>
+          </p:cNvPr>
+          <p:cNvSpPr/>
+          <p:nvPr/>
+        </p:nvSpPr>
+        <p:spPr>
+          <a:xfrm>
+            <a:off x="2251424" y="4756233"/>
+            <a:ext cx="1668174" cy="771787"/>
+          </a:xfrm>
+          <a:prstGeom prst="roundRect">
+            <a:avLst/>
+          </a:prstGeom>
+          <a:solidFill>
+            <a:schemeClr val="bg1">
+              <a:lumMod val="50000"/>
+            </a:schemeClr>
+          </a:solidFill>
+          <a:ln w="28575">
+            <a:solidFill>
+              <a:schemeClr val="tx1"/>
+            </a:solidFill>
+          </a:ln>
+          <a:effectLst>
+            <a:outerShdw blurRad="50800" dist="38100" dir="2700000" algn="tl" rotWithShape="0">
+              <a:prstClr val="black">
+                <a:alpha val="40000"/>
+              </a:prstClr>
+            </a:outerShdw>
+          </a:effectLst>
+        </p:spPr>
+        <p:style>
+          <a:lnRef idx="1">
+            <a:schemeClr val="accent1"/>
+          </a:lnRef>
+          <a:fillRef idx="3">
+            <a:schemeClr val="accent1"/>
+          </a:fillRef>
+          <a:effectRef idx="2">
+            <a:schemeClr val="accent1"/>
+          </a:effectRef>
+          <a:fontRef idx="minor">
+            <a:schemeClr val="lt1"/>
+          </a:fontRef>
+        </p:style>
+        <p:txBody>
+          <a:bodyPr rtlCol="0" anchor="ctr"/>
+          <a:lstStyle/>
+          <a:p>
+            <a:pPr algn="ctr"/>
+            <a:r>
+              <a:rPr lang="en-US" dirty="0"/>
+              <a:t>Scan Engine</a:t>
+            </a:r>
+          </a:p>
+        </p:txBody>
+      </p:sp>
+      <p:sp>
+        <p:nvSpPr>
+          <p:cNvPr id="30" name="TextBox 29">
+            <a:extLst>
+              <a:ext uri="{FF2B5EF4-FFF2-40B4-BE49-F238E27FC236}">
+                <a16:creationId xmlns:a16="http://schemas.microsoft.com/office/drawing/2014/main" id="{38BC5DD7-354A-42BE-BF48-56604EDBACF2}"/>
+              </a:ext>
+            </a:extLst>
+          </p:cNvPr>
+          <p:cNvSpPr txBox="1"/>
+          <p:nvPr/>
+        </p:nvSpPr>
+        <p:spPr>
+          <a:xfrm>
+            <a:off x="6305545" y="1275818"/>
+            <a:ext cx="1684796" cy="523220"/>
+          </a:xfrm>
+          <a:prstGeom prst="rect">
+            <a:avLst/>
+          </a:prstGeom>
+          <a:noFill/>
+        </p:spPr>
+        <p:txBody>
+          <a:bodyPr wrap="square" lIns="0" rIns="0" rtlCol="0">
+            <a:spAutoFit/>
+          </a:bodyPr>
+          <a:lstStyle/>
+          <a:p>
+            <a:r>
+              <a:rPr lang="en-US" sz="2800" b="1" dirty="0"/>
+              <a:t>FPGA</a:t>
+            </a:r>
+          </a:p>
+        </p:txBody>
+      </p:sp>
+      <p:sp>
+        <p:nvSpPr>
+          <p:cNvPr id="33" name="Rounded Rectangle 6">
+            <a:extLst>
+              <a:ext uri="{FF2B5EF4-FFF2-40B4-BE49-F238E27FC236}">
+                <a16:creationId xmlns:a16="http://schemas.microsoft.com/office/drawing/2014/main" id="{9373CD64-F078-41EF-845D-2AB33764611C}"/>
+              </a:ext>
+            </a:extLst>
+          </p:cNvPr>
+          <p:cNvSpPr/>
+          <p:nvPr/>
+        </p:nvSpPr>
+        <p:spPr>
+          <a:xfrm>
+            <a:off x="6208022" y="4756190"/>
+            <a:ext cx="1668174" cy="771787"/>
+          </a:xfrm>
+          <a:prstGeom prst="roundRect">
+            <a:avLst/>
+          </a:prstGeom>
+          <a:solidFill>
+            <a:schemeClr val="bg1">
+              <a:lumMod val="50000"/>
+            </a:schemeClr>
+          </a:solidFill>
+          <a:ln w="28575">
+            <a:solidFill>
+              <a:schemeClr val="tx1"/>
+            </a:solidFill>
+          </a:ln>
+          <a:effectLst>
+            <a:outerShdw blurRad="50800" dist="38100" dir="2700000" algn="tl" rotWithShape="0">
+              <a:prstClr val="black">
+                <a:alpha val="40000"/>
+              </a:prstClr>
+            </a:outerShdw>
+          </a:effectLst>
+        </p:spPr>
+        <p:style>
+          <a:lnRef idx="1">
+            <a:schemeClr val="accent1"/>
+          </a:lnRef>
+          <a:fillRef idx="3">
+            <a:schemeClr val="accent1"/>
+          </a:fillRef>
+          <a:effectRef idx="2">
+            <a:schemeClr val="accent1"/>
+          </a:effectRef>
+          <a:fontRef idx="minor">
+            <a:schemeClr val="lt1"/>
+          </a:fontRef>
+        </p:style>
+        <p:txBody>
+          <a:bodyPr rtlCol="0" anchor="ctr"/>
+          <a:lstStyle/>
+          <a:p>
+            <a:pPr algn="ctr"/>
+            <a:r>
+              <a:rPr lang="en-US" dirty="0"/>
+              <a:t>RIO Scan Interface</a:t>
+            </a:r>
+          </a:p>
+        </p:txBody>
+      </p:sp>
+      <p:sp>
+        <p:nvSpPr>
+          <p:cNvPr id="35" name="Up Arrow 20">
+            <a:extLst>
+              <a:ext uri="{FF2B5EF4-FFF2-40B4-BE49-F238E27FC236}">
+                <a16:creationId xmlns:a16="http://schemas.microsoft.com/office/drawing/2014/main" id="{E582EC7F-1849-4976-8977-DD6399F3F551}"/>
+              </a:ext>
+            </a:extLst>
+          </p:cNvPr>
+          <p:cNvSpPr/>
+          <p:nvPr/>
+        </p:nvSpPr>
+        <p:spPr>
+          <a:xfrm>
+            <a:off x="1342520" y="4114103"/>
+            <a:ext cx="251671" cy="597829"/>
+          </a:xfrm>
+          <a:prstGeom prst="upArrow">
+            <a:avLst/>
+          </a:prstGeom>
+          <a:solidFill>
+            <a:schemeClr val="tx2"/>
+          </a:solidFill>
+          <a:ln>
+            <a:noFill/>
+          </a:ln>
+          <a:effectLst>
+            <a:outerShdw blurRad="50800" dist="38100" dir="2700000" algn="tl" rotWithShape="0">
+              <a:prstClr val="black">
+                <a:alpha val="40000"/>
+              </a:prstClr>
+            </a:outerShdw>
+          </a:effectLst>
+        </p:spPr>
+        <p:style>
+          <a:lnRef idx="1">
+            <a:schemeClr val="accent1"/>
+          </a:lnRef>
+          <a:fillRef idx="3">
+            <a:schemeClr val="accent1"/>
+          </a:fillRef>
+          <a:effectRef idx="2">
+            <a:schemeClr val="accent1"/>
+          </a:effectRef>
+          <a:fontRef idx="minor">
+            <a:schemeClr val="lt1"/>
+          </a:fontRef>
+        </p:style>
+        <p:txBody>
+          <a:bodyPr rtlCol="0" anchor="ctr"/>
+          <a:lstStyle/>
+          <a:p>
+            <a:pPr algn="ctr"/>
+            <a:endParaRPr lang="en-US"/>
+          </a:p>
+        </p:txBody>
+      </p:sp>
+      <p:sp>
+        <p:nvSpPr>
+          <p:cNvPr id="38" name="Up Arrow 21">
+            <a:extLst>
+              <a:ext uri="{FF2B5EF4-FFF2-40B4-BE49-F238E27FC236}">
+                <a16:creationId xmlns:a16="http://schemas.microsoft.com/office/drawing/2014/main" id="{C61B8614-BF0A-45E4-B7D4-750199B9F1C1}"/>
+              </a:ext>
+            </a:extLst>
+          </p:cNvPr>
+          <p:cNvSpPr/>
+          <p:nvPr/>
+        </p:nvSpPr>
+        <p:spPr>
+          <a:xfrm rot="10800000">
+            <a:off x="893892" y="4128889"/>
+            <a:ext cx="251671" cy="568256"/>
+          </a:xfrm>
+          <a:prstGeom prst="upArrow">
+            <a:avLst/>
+          </a:prstGeom>
+          <a:solidFill>
+            <a:schemeClr val="tx2"/>
+          </a:solidFill>
+          <a:ln>
+            <a:noFill/>
+          </a:ln>
+          <a:effectLst>
+            <a:outerShdw blurRad="50800" dist="38100" dir="2700000" algn="tl" rotWithShape="0">
+              <a:prstClr val="black">
+                <a:alpha val="40000"/>
+              </a:prstClr>
+            </a:outerShdw>
+          </a:effectLst>
+        </p:spPr>
+        <p:style>
+          <a:lnRef idx="1">
+            <a:schemeClr val="accent1"/>
+          </a:lnRef>
+          <a:fillRef idx="3">
+            <a:schemeClr val="accent1"/>
+          </a:fillRef>
+          <a:effectRef idx="2">
+            <a:schemeClr val="accent1"/>
+          </a:effectRef>
+          <a:fontRef idx="minor">
+            <a:schemeClr val="lt1"/>
+          </a:fontRef>
+        </p:style>
+        <p:txBody>
+          <a:bodyPr rtlCol="0" anchor="ctr"/>
+          <a:lstStyle/>
+          <a:p>
+            <a:pPr algn="ctr"/>
+            <a:endParaRPr lang="en-US"/>
+          </a:p>
+        </p:txBody>
+      </p:sp>
+      <p:sp>
+        <p:nvSpPr>
+          <p:cNvPr id="39" name="Up Arrow 20">
+            <a:extLst>
+              <a:ext uri="{FF2B5EF4-FFF2-40B4-BE49-F238E27FC236}">
+                <a16:creationId xmlns:a16="http://schemas.microsoft.com/office/drawing/2014/main" id="{B5968EDD-31CE-49B9-85C2-41063DE49553}"/>
+              </a:ext>
+            </a:extLst>
+          </p:cNvPr>
+          <p:cNvSpPr/>
+          <p:nvPr/>
+        </p:nvSpPr>
+        <p:spPr>
+          <a:xfrm rot="5400000">
+            <a:off x="4892824" y="4064746"/>
+            <a:ext cx="251671" cy="2154680"/>
+          </a:xfrm>
+          <a:prstGeom prst="upArrow">
+            <a:avLst/>
+          </a:prstGeom>
+          <a:solidFill>
+            <a:schemeClr val="tx2"/>
+          </a:solidFill>
+          <a:ln>
+            <a:noFill/>
+          </a:ln>
+          <a:effectLst>
+            <a:outerShdw blurRad="50800" dist="38100" dir="2700000" algn="tl" rotWithShape="0">
+              <a:prstClr val="black">
+                <a:alpha val="40000"/>
+              </a:prstClr>
+            </a:outerShdw>
+          </a:effectLst>
+        </p:spPr>
+        <p:style>
+          <a:lnRef idx="1">
+            <a:schemeClr val="accent1"/>
+          </a:lnRef>
+          <a:fillRef idx="3">
+            <a:schemeClr val="accent1"/>
+          </a:fillRef>
+          <a:effectRef idx="2">
+            <a:schemeClr val="accent1"/>
+          </a:effectRef>
+          <a:fontRef idx="minor">
+            <a:schemeClr val="lt1"/>
+          </a:fontRef>
+        </p:style>
+        <p:txBody>
+          <a:bodyPr rtlCol="0" anchor="ctr"/>
+          <a:lstStyle/>
+          <a:p>
+            <a:pPr algn="ctr"/>
+            <a:endParaRPr lang="en-US"/>
+          </a:p>
+        </p:txBody>
+      </p:sp>
+      <p:sp>
+        <p:nvSpPr>
+          <p:cNvPr id="40" name="Up Arrow 20">
+            <a:extLst>
+              <a:ext uri="{FF2B5EF4-FFF2-40B4-BE49-F238E27FC236}">
+                <a16:creationId xmlns:a16="http://schemas.microsoft.com/office/drawing/2014/main" id="{0E9F75DD-7157-4081-B2B2-38AE1BF5A6F3}"/>
+              </a:ext>
+            </a:extLst>
+          </p:cNvPr>
+          <p:cNvSpPr/>
+          <p:nvPr/>
+        </p:nvSpPr>
+        <p:spPr>
+          <a:xfrm rot="5400000">
+            <a:off x="1999920" y="4843170"/>
+            <a:ext cx="251671" cy="597829"/>
+          </a:xfrm>
+          <a:prstGeom prst="upArrow">
+            <a:avLst/>
+          </a:prstGeom>
+          <a:solidFill>
+            <a:schemeClr val="tx2"/>
+          </a:solidFill>
+          <a:ln>
+            <a:noFill/>
+          </a:ln>
+          <a:effectLst>
+            <a:outerShdw blurRad="50800" dist="38100" dir="2700000" algn="tl" rotWithShape="0">
+              <a:prstClr val="black">
+                <a:alpha val="40000"/>
+              </a:prstClr>
+            </a:outerShdw>
+          </a:effectLst>
+        </p:spPr>
+        <p:style>
+          <a:lnRef idx="1">
+            <a:schemeClr val="accent1"/>
+          </a:lnRef>
+          <a:fillRef idx="3">
+            <a:schemeClr val="accent1"/>
+          </a:fillRef>
+          <a:effectRef idx="2">
+            <a:schemeClr val="accent1"/>
+          </a:effectRef>
+          <a:fontRef idx="minor">
+            <a:schemeClr val="lt1"/>
+          </a:fontRef>
+        </p:style>
+        <p:txBody>
+          <a:bodyPr rtlCol="0" anchor="ctr"/>
+          <a:lstStyle/>
+          <a:p>
+            <a:pPr algn="ctr"/>
+            <a:endParaRPr lang="en-US"/>
+          </a:p>
+        </p:txBody>
+      </p:sp>
+      <p:sp>
+        <p:nvSpPr>
+          <p:cNvPr id="43" name="Up Arrow 20">
+            <a:extLst>
+              <a:ext uri="{FF2B5EF4-FFF2-40B4-BE49-F238E27FC236}">
+                <a16:creationId xmlns:a16="http://schemas.microsoft.com/office/drawing/2014/main" id="{B7F83BDE-9377-4437-99E5-247F3D3AC628}"/>
+              </a:ext>
+            </a:extLst>
+          </p:cNvPr>
+          <p:cNvSpPr/>
+          <p:nvPr/>
+        </p:nvSpPr>
+        <p:spPr>
+          <a:xfrm rot="5400000">
+            <a:off x="8222879" y="4705154"/>
+            <a:ext cx="251671" cy="873862"/>
+          </a:xfrm>
+          <a:prstGeom prst="upArrow">
+            <a:avLst/>
+          </a:prstGeom>
+          <a:solidFill>
+            <a:schemeClr val="tx2"/>
+          </a:solidFill>
+          <a:ln>
+            <a:noFill/>
+          </a:ln>
+          <a:effectLst>
+            <a:outerShdw blurRad="50800" dist="38100" dir="2700000" algn="tl" rotWithShape="0">
+              <a:prstClr val="black">
+                <a:alpha val="40000"/>
+              </a:prstClr>
+            </a:outerShdw>
+          </a:effectLst>
+        </p:spPr>
+        <p:style>
+          <a:lnRef idx="1">
+            <a:schemeClr val="accent1"/>
+          </a:lnRef>
+          <a:fillRef idx="3">
+            <a:schemeClr val="accent1"/>
+          </a:fillRef>
+          <a:effectRef idx="2">
+            <a:schemeClr val="accent1"/>
+          </a:effectRef>
+          <a:fontRef idx="minor">
+            <a:schemeClr val="lt1"/>
+          </a:fontRef>
+        </p:style>
+        <p:txBody>
+          <a:bodyPr rtlCol="0" anchor="ctr"/>
+          <a:lstStyle/>
+          <a:p>
+            <a:pPr algn="ctr"/>
+            <a:endParaRPr lang="en-US"/>
+          </a:p>
+        </p:txBody>
+      </p:sp>
+      <p:sp>
+        <p:nvSpPr>
+          <p:cNvPr id="44" name="Content Placeholder 3">
+            <a:extLst>
+              <a:ext uri="{FF2B5EF4-FFF2-40B4-BE49-F238E27FC236}">
+                <a16:creationId xmlns:a16="http://schemas.microsoft.com/office/drawing/2014/main" id="{C92D10F8-371D-4CE5-AC65-B314F1696AE5}"/>
+              </a:ext>
+            </a:extLst>
+          </p:cNvPr>
+          <p:cNvSpPr txBox="1">
+            <a:spLocks/>
           </p:cNvSpPr>
-          <p:nvPr>
-            <p:ph sz="half" idx="2"/>
-          </p:nvPr>
-        </p:nvSpPr>
-        <p:spPr/>
-        <p:txBody>
-          <a:bodyPr/>
-          <a:lstStyle/>
+          <p:nvPr/>
+        </p:nvSpPr>
+        <p:spPr>
+          <a:xfrm>
+            <a:off x="8349494" y="1440666"/>
+            <a:ext cx="3660559" cy="2845008"/>
+          </a:xfrm>
+          <a:prstGeom prst="rect">
+            <a:avLst/>
+          </a:prstGeom>
+        </p:spPr>
+        <p:txBody>
+          <a:bodyPr vert="horz" lIns="0" tIns="45717" rIns="0" bIns="45717" rtlCol="0">
+            <a:noAutofit/>
+          </a:bodyPr>
+          <a:lstStyle>
+            <a:lvl1pPr marL="0" marR="0" indent="0" algn="l" defTabSz="1219170" rtl="0" eaLnBrk="1" fontAlgn="auto" latinLnBrk="0" hangingPunct="1">
+              <a:lnSpc>
+                <a:spcPct val="100000"/>
+              </a:lnSpc>
+              <a:spcBef>
+                <a:spcPts val="533"/>
+              </a:spcBef>
+              <a:spcAft>
+                <a:spcPts val="0"/>
+              </a:spcAft>
+              <a:buClr>
+                <a:schemeClr val="bg2">
+                  <a:lumMod val="50000"/>
+                </a:schemeClr>
+              </a:buClr>
+              <a:buSzPct val="70000"/>
+              <a:buFont typeface="Wingdings" charset="2"/>
+              <a:buNone/>
+              <a:tabLst>
+                <a:tab pos="243834" algn="l"/>
+              </a:tabLst>
+              <a:defRPr lang="en-US" sz="2400" b="0" i="0" kern="1200" baseline="0" dirty="0" smtClean="0">
+                <a:solidFill>
+                  <a:schemeClr val="bg2">
+                    <a:lumMod val="25000"/>
+                  </a:schemeClr>
+                </a:solidFill>
+                <a:latin typeface="+mn-lt"/>
+                <a:ea typeface="Arial" charset="0"/>
+                <a:cs typeface="Arial" charset="0"/>
+              </a:defRPr>
+            </a:lvl1pPr>
+            <a:lvl2pPr marL="609585" indent="-243834" algn="l" defTabSz="1219170" rtl="0" eaLnBrk="1" latinLnBrk="0" hangingPunct="1">
+              <a:lnSpc>
+                <a:spcPct val="90000"/>
+              </a:lnSpc>
+              <a:spcBef>
+                <a:spcPts val="667"/>
+              </a:spcBef>
+              <a:buClr>
+                <a:schemeClr val="bg2">
+                  <a:lumMod val="50000"/>
+                </a:schemeClr>
+              </a:buClr>
+              <a:buSzPct val="70000"/>
+              <a:buFont typeface="Wingdings" charset="2"/>
+              <a:buChar char="§"/>
+              <a:defRPr lang="en-US" sz="2133" b="0" i="0" kern="1200" baseline="0" dirty="0" smtClean="0">
+                <a:solidFill>
+                  <a:schemeClr val="bg2">
+                    <a:lumMod val="25000"/>
+                  </a:schemeClr>
+                </a:solidFill>
+                <a:latin typeface="+mn-lt"/>
+                <a:ea typeface="+mn-ea"/>
+                <a:cs typeface="Univers LT Std 45 Light"/>
+              </a:defRPr>
+            </a:lvl2pPr>
+            <a:lvl3pPr marL="975336" indent="-243834" algn="l" defTabSz="1219170" rtl="0" eaLnBrk="1" latinLnBrk="0" hangingPunct="1">
+              <a:lnSpc>
+                <a:spcPct val="90000"/>
+              </a:lnSpc>
+              <a:spcBef>
+                <a:spcPts val="667"/>
+              </a:spcBef>
+              <a:buClr>
+                <a:schemeClr val="bg2">
+                  <a:lumMod val="50000"/>
+                </a:schemeClr>
+              </a:buClr>
+              <a:buSzPct val="70000"/>
+              <a:buFont typeface="Wingdings" charset="2"/>
+              <a:buChar char="§"/>
+              <a:defRPr lang="en-US" sz="1867" b="0" i="0" kern="1200" baseline="0" dirty="0" smtClean="0">
+                <a:solidFill>
+                  <a:schemeClr val="bg2">
+                    <a:lumMod val="25000"/>
+                  </a:schemeClr>
+                </a:solidFill>
+                <a:latin typeface="+mn-lt"/>
+                <a:ea typeface="+mn-ea"/>
+                <a:cs typeface="Univers LT Std 45 Light"/>
+              </a:defRPr>
+            </a:lvl3pPr>
+            <a:lvl4pPr marL="1219170" indent="-243834" algn="l" defTabSz="1219170" rtl="0" eaLnBrk="1" latinLnBrk="0" hangingPunct="1">
+              <a:lnSpc>
+                <a:spcPct val="90000"/>
+              </a:lnSpc>
+              <a:spcBef>
+                <a:spcPts val="667"/>
+              </a:spcBef>
+              <a:buClr>
+                <a:schemeClr val="bg2">
+                  <a:lumMod val="50000"/>
+                </a:schemeClr>
+              </a:buClr>
+              <a:buSzPct val="70000"/>
+              <a:buFont typeface="Wingdings" charset="2"/>
+              <a:buChar char="§"/>
+              <a:defRPr lang="en-US" sz="1600" b="0" i="0" kern="1200" baseline="0" dirty="0" smtClean="0">
+                <a:solidFill>
+                  <a:schemeClr val="bg2">
+                    <a:lumMod val="25000"/>
+                  </a:schemeClr>
+                </a:solidFill>
+                <a:latin typeface="+mn-lt"/>
+                <a:ea typeface="+mn-ea"/>
+                <a:cs typeface="Univers LT Std 45 Light"/>
+              </a:defRPr>
+            </a:lvl4pPr>
+            <a:lvl5pPr marL="2438339" indent="0" algn="l" defTabSz="1219170" rtl="0" eaLnBrk="1" latinLnBrk="0" hangingPunct="1">
+              <a:lnSpc>
+                <a:spcPct val="90000"/>
+              </a:lnSpc>
+              <a:spcBef>
+                <a:spcPts val="667"/>
+              </a:spcBef>
+              <a:buFont typeface="Arial"/>
+              <a:buNone/>
+              <a:defRPr sz="2133" b="0" i="0" kern="1200" baseline="0">
+                <a:solidFill>
+                  <a:schemeClr val="bg2">
+                    <a:lumMod val="25000"/>
+                  </a:schemeClr>
+                </a:solidFill>
+                <a:latin typeface="Helvetica Neue Light" charset="0"/>
+                <a:ea typeface="Helvetica Neue Light" charset="0"/>
+                <a:cs typeface="Helvetica Neue Light" charset="0"/>
+              </a:defRPr>
+            </a:lvl5pPr>
+            <a:lvl6pPr marL="3352716" indent="-304792" algn="l" defTabSz="1219170" rtl="0" eaLnBrk="1" latinLnBrk="0" hangingPunct="1">
+              <a:lnSpc>
+                <a:spcPct val="90000"/>
+              </a:lnSpc>
+              <a:spcBef>
+                <a:spcPts val="667"/>
+              </a:spcBef>
+              <a:buFont typeface="Arial"/>
+              <a:buChar char="•"/>
+              <a:defRPr sz="2400" kern="1200">
+                <a:solidFill>
+                  <a:schemeClr val="tx1"/>
+                </a:solidFill>
+                <a:latin typeface="+mn-lt"/>
+                <a:ea typeface="+mn-ea"/>
+                <a:cs typeface="+mn-cs"/>
+              </a:defRPr>
+            </a:lvl6pPr>
+            <a:lvl7pPr marL="3962301" indent="-304792" algn="l" defTabSz="1219170" rtl="0" eaLnBrk="1" latinLnBrk="0" hangingPunct="1">
+              <a:lnSpc>
+                <a:spcPct val="90000"/>
+              </a:lnSpc>
+              <a:spcBef>
+                <a:spcPts val="667"/>
+              </a:spcBef>
+              <a:buFont typeface="Arial"/>
+              <a:buChar char="•"/>
+              <a:defRPr sz="2400" kern="1200">
+                <a:solidFill>
+                  <a:schemeClr val="tx1"/>
+                </a:solidFill>
+                <a:latin typeface="+mn-lt"/>
+                <a:ea typeface="+mn-ea"/>
+                <a:cs typeface="+mn-cs"/>
+              </a:defRPr>
+            </a:lvl7pPr>
+            <a:lvl8pPr marL="4571886" indent="-304792" algn="l" defTabSz="1219170" rtl="0" eaLnBrk="1" latinLnBrk="0" hangingPunct="1">
+              <a:lnSpc>
+                <a:spcPct val="90000"/>
+              </a:lnSpc>
+              <a:spcBef>
+                <a:spcPts val="667"/>
+              </a:spcBef>
+              <a:buFont typeface="Arial"/>
+              <a:buChar char="•"/>
+              <a:defRPr sz="2400" kern="1200">
+                <a:solidFill>
+                  <a:schemeClr val="tx1"/>
+                </a:solidFill>
+                <a:latin typeface="+mn-lt"/>
+                <a:ea typeface="+mn-ea"/>
+                <a:cs typeface="+mn-cs"/>
+              </a:defRPr>
+            </a:lvl8pPr>
+            <a:lvl9pPr marL="5181470" indent="-304792" algn="l" defTabSz="1219170" rtl="0" eaLnBrk="1" latinLnBrk="0" hangingPunct="1">
+              <a:lnSpc>
+                <a:spcPct val="90000"/>
+              </a:lnSpc>
+              <a:spcBef>
+                <a:spcPts val="667"/>
+              </a:spcBef>
+              <a:buFont typeface="Arial"/>
+              <a:buChar char="•"/>
+              <a:defRPr sz="2400" kern="1200">
+                <a:solidFill>
+                  <a:schemeClr val="tx1"/>
+                </a:solidFill>
+                <a:latin typeface="+mn-lt"/>
+                <a:ea typeface="+mn-ea"/>
+                <a:cs typeface="+mn-cs"/>
+              </a:defRPr>
+            </a:lvl9pPr>
+          </a:lstStyle>
           <a:p>
             <a:r>
               <a:rPr lang="en-US" dirty="0"/>
@@ -9915,8 +11194,8 @@
         </p:nvSpPr>
         <p:spPr>
           <a:xfrm>
-            <a:off x="838200" y="1825625"/>
-            <a:ext cx="10515600" cy="1053976"/>
+            <a:off x="605367" y="975360"/>
+            <a:ext cx="10972800" cy="1185949"/>
           </a:xfrm>
         </p:spPr>
         <p:txBody>
@@ -9959,8 +11238,200 @@
         </p:nvSpPr>
         <p:spPr>
           <a:xfrm>
-            <a:off x="294867" y="4213645"/>
+            <a:off x="276394" y="3073081"/>
             <a:ext cx="1828800" cy="771787"/>
+          </a:xfrm>
+          <a:prstGeom prst="roundRect">
+            <a:avLst/>
+          </a:prstGeom>
+          <a:solidFill>
+            <a:schemeClr val="tx2">
+              <a:lumMod val="50000"/>
+            </a:schemeClr>
+          </a:solidFill>
+          <a:ln w="28575">
+            <a:solidFill>
+              <a:schemeClr val="tx1"/>
+            </a:solidFill>
+          </a:ln>
+          <a:effectLst>
+            <a:outerShdw blurRad="50800" dist="38100" dir="2700000" algn="tl" rotWithShape="0">
+              <a:prstClr val="black">
+                <a:alpha val="40000"/>
+              </a:prstClr>
+            </a:outerShdw>
+          </a:effectLst>
+        </p:spPr>
+        <p:style>
+          <a:lnRef idx="1">
+            <a:schemeClr val="accent1"/>
+          </a:lnRef>
+          <a:fillRef idx="3">
+            <a:schemeClr val="accent1"/>
+          </a:fillRef>
+          <a:effectRef idx="2">
+            <a:schemeClr val="accent1"/>
+          </a:effectRef>
+          <a:fontRef idx="minor">
+            <a:schemeClr val="lt1"/>
+          </a:fontRef>
+        </p:style>
+        <p:txBody>
+          <a:bodyPr rtlCol="0" anchor="ctr"/>
+          <a:lstStyle/>
+          <a:p>
+            <a:pPr algn="ctr"/>
+            <a:r>
+              <a:rPr lang="en-US" dirty="0"/>
+              <a:t>Custom Input Module 1</a:t>
+            </a:r>
+          </a:p>
+        </p:txBody>
+      </p:sp>
+      <p:sp>
+        <p:nvSpPr>
+          <p:cNvPr id="13" name="Rounded Rectangle 4">
+            <a:extLst>
+              <a:ext uri="{FF2B5EF4-FFF2-40B4-BE49-F238E27FC236}">
+                <a16:creationId xmlns:a16="http://schemas.microsoft.com/office/drawing/2014/main" id="{DF97D33A-496D-415C-9003-D9090F872DE8}"/>
+              </a:ext>
+            </a:extLst>
+          </p:cNvPr>
+          <p:cNvSpPr/>
+          <p:nvPr/>
+        </p:nvSpPr>
+        <p:spPr>
+          <a:xfrm>
+            <a:off x="2645735" y="3051838"/>
+            <a:ext cx="1828800" cy="771787"/>
+          </a:xfrm>
+          <a:prstGeom prst="roundRect">
+            <a:avLst/>
+          </a:prstGeom>
+          <a:solidFill>
+            <a:schemeClr val="accent6">
+              <a:lumMod val="75000"/>
+            </a:schemeClr>
+          </a:solidFill>
+          <a:ln w="28575">
+            <a:solidFill>
+              <a:schemeClr val="tx1"/>
+            </a:solidFill>
+          </a:ln>
+          <a:effectLst>
+            <a:outerShdw blurRad="50800" dist="38100" dir="2700000" algn="tl" rotWithShape="0">
+              <a:prstClr val="black">
+                <a:alpha val="40000"/>
+              </a:prstClr>
+            </a:outerShdw>
+          </a:effectLst>
+        </p:spPr>
+        <p:style>
+          <a:lnRef idx="1">
+            <a:schemeClr val="accent1"/>
+          </a:lnRef>
+          <a:fillRef idx="3">
+            <a:schemeClr val="accent1"/>
+          </a:fillRef>
+          <a:effectRef idx="2">
+            <a:schemeClr val="accent1"/>
+          </a:effectRef>
+          <a:fontRef idx="minor">
+            <a:schemeClr val="lt1"/>
+          </a:fontRef>
+        </p:style>
+        <p:txBody>
+          <a:bodyPr rtlCol="0" anchor="ctr"/>
+          <a:lstStyle/>
+          <a:p>
+            <a:pPr algn="ctr"/>
+            <a:r>
+              <a:rPr lang="en-US" dirty="0"/>
+              <a:t>Custom Process Module 1</a:t>
+            </a:r>
+          </a:p>
+        </p:txBody>
+      </p:sp>
+      <p:sp>
+        <p:nvSpPr>
+          <p:cNvPr id="14" name="Rounded Rectangle 5">
+            <a:extLst>
+              <a:ext uri="{FF2B5EF4-FFF2-40B4-BE49-F238E27FC236}">
+                <a16:creationId xmlns:a16="http://schemas.microsoft.com/office/drawing/2014/main" id="{AC7AE688-9FA1-4E17-8726-8DE82A9C07BB}"/>
+              </a:ext>
+            </a:extLst>
+          </p:cNvPr>
+          <p:cNvSpPr/>
+          <p:nvPr/>
+        </p:nvSpPr>
+        <p:spPr>
+          <a:xfrm>
+            <a:off x="4897956" y="3051836"/>
+            <a:ext cx="1828800" cy="771787"/>
+          </a:xfrm>
+          <a:prstGeom prst="roundRect">
+            <a:avLst/>
+          </a:prstGeom>
+          <a:solidFill>
+            <a:schemeClr val="tx2">
+              <a:lumMod val="50000"/>
+            </a:schemeClr>
+          </a:solidFill>
+          <a:ln w="28575">
+            <a:solidFill>
+              <a:schemeClr val="tx1"/>
+            </a:solidFill>
+          </a:ln>
+          <a:effectLst>
+            <a:outerShdw blurRad="50800" dist="38100" dir="2700000" algn="tl" rotWithShape="0">
+              <a:prstClr val="black">
+                <a:alpha val="40000"/>
+              </a:prstClr>
+            </a:outerShdw>
+          </a:effectLst>
+        </p:spPr>
+        <p:style>
+          <a:lnRef idx="1">
+            <a:schemeClr val="accent1"/>
+          </a:lnRef>
+          <a:fillRef idx="3">
+            <a:schemeClr val="accent1"/>
+          </a:fillRef>
+          <a:effectRef idx="2">
+            <a:schemeClr val="accent1"/>
+          </a:effectRef>
+          <a:fontRef idx="minor">
+            <a:schemeClr val="lt1"/>
+          </a:fontRef>
+        </p:style>
+        <p:txBody>
+          <a:bodyPr rtlCol="0" anchor="ctr"/>
+          <a:lstStyle/>
+          <a:p>
+            <a:pPr algn="ctr"/>
+            <a:r>
+              <a:rPr lang="en-US" dirty="0"/>
+              <a:t>Scan Engine Module</a:t>
+            </a:r>
+          </a:p>
+        </p:txBody>
+      </p:sp>
+      <p:sp>
+        <p:nvSpPr>
+          <p:cNvPr id="15" name="Rounded Rectangle 6">
+            <a:extLst>
+              <a:ext uri="{FF2B5EF4-FFF2-40B4-BE49-F238E27FC236}">
+                <a16:creationId xmlns:a16="http://schemas.microsoft.com/office/drawing/2014/main" id="{175EFA03-0F68-4E83-A963-597CBB5A67DF}"/>
+              </a:ext>
+            </a:extLst>
+          </p:cNvPr>
+          <p:cNvSpPr/>
+          <p:nvPr/>
+        </p:nvSpPr>
+        <p:spPr>
+          <a:xfrm>
+            <a:off x="276395" y="2161309"/>
+            <a:ext cx="6450362" cy="771787"/>
           </a:xfrm>
           <a:prstGeom prst="roundRect">
             <a:avLst/>
@@ -10002,17 +11473,17 @@
             <a:pPr algn="ctr"/>
             <a:r>
               <a:rPr lang="en-US" dirty="0"/>
-              <a:t>Custom Input Module 1</a:t>
-            </a:r>
-          </a:p>
-        </p:txBody>
-      </p:sp>
-      <p:sp>
-        <p:nvSpPr>
-          <p:cNvPr id="13" name="Rounded Rectangle 4">
+              <a:t>Engine</a:t>
+            </a:r>
+          </a:p>
+        </p:txBody>
+      </p:sp>
+      <p:sp>
+        <p:nvSpPr>
+          <p:cNvPr id="19" name="Up Arrow 10">
             <a:extLst>
               <a:ext uri="{FF2B5EF4-FFF2-40B4-BE49-F238E27FC236}">
-                <a16:creationId xmlns:a16="http://schemas.microsoft.com/office/drawing/2014/main" id="{DF97D33A-496D-415C-9003-D9090F872DE8}"/>
+                <a16:creationId xmlns:a16="http://schemas.microsoft.com/office/drawing/2014/main" id="{2607A99D-61B4-467E-BBED-0AA7D97CB935}"/>
               </a:ext>
             </a:extLst>
           </p:cNvPr>
@@ -10020,9 +11491,485 @@
           <p:nvPr/>
         </p:nvSpPr>
         <p:spPr>
-          <a:xfrm>
-            <a:off x="2664208" y="4192402"/>
+          <a:xfrm rot="5400000">
+            <a:off x="2308189" y="3097288"/>
+            <a:ext cx="251671" cy="680885"/>
+          </a:xfrm>
+          <a:prstGeom prst="upArrow">
+            <a:avLst/>
+          </a:prstGeom>
+          <a:solidFill>
+            <a:schemeClr val="accent1"/>
+          </a:solidFill>
+          <a:ln>
+            <a:noFill/>
+          </a:ln>
+          <a:effectLst>
+            <a:outerShdw blurRad="50800" dist="38100" dir="2700000" algn="tl" rotWithShape="0">
+              <a:prstClr val="black">
+                <a:alpha val="40000"/>
+              </a:prstClr>
+            </a:outerShdw>
+          </a:effectLst>
+        </p:spPr>
+        <p:style>
+          <a:lnRef idx="1">
+            <a:schemeClr val="accent1"/>
+          </a:lnRef>
+          <a:fillRef idx="3">
+            <a:schemeClr val="accent1"/>
+          </a:fillRef>
+          <a:effectRef idx="2">
+            <a:schemeClr val="accent1"/>
+          </a:effectRef>
+          <a:fontRef idx="minor">
+            <a:schemeClr val="lt1"/>
+          </a:fontRef>
+        </p:style>
+        <p:txBody>
+          <a:bodyPr rtlCol="0" anchor="ctr"/>
+          <a:lstStyle/>
+          <a:p>
+            <a:pPr algn="ctr"/>
+            <a:endParaRPr lang="en-US"/>
+          </a:p>
+        </p:txBody>
+      </p:sp>
+      <p:sp>
+        <p:nvSpPr>
+          <p:cNvPr id="21" name="Cloud 20">
+            <a:extLst>
+              <a:ext uri="{FF2B5EF4-FFF2-40B4-BE49-F238E27FC236}">
+                <a16:creationId xmlns:a16="http://schemas.microsoft.com/office/drawing/2014/main" id="{90E59BB9-204E-4888-8718-CEF2A224153E}"/>
+              </a:ext>
+            </a:extLst>
+          </p:cNvPr>
+          <p:cNvSpPr/>
+          <p:nvPr/>
+        </p:nvSpPr>
+        <p:spPr>
+          <a:xfrm>
+            <a:off x="504067" y="4361383"/>
+            <a:ext cx="1373453" cy="839972"/>
+          </a:xfrm>
+          <a:prstGeom prst="cloud">
+            <a:avLst/>
+          </a:prstGeom>
+          <a:noFill/>
+          <a:ln w="12700">
+            <a:solidFill>
+              <a:srgbClr val="0A60A3"/>
+            </a:solidFill>
+          </a:ln>
+          <a:effectLst/>
+        </p:spPr>
+        <p:style>
+          <a:lnRef idx="1">
+            <a:schemeClr val="accent1"/>
+          </a:lnRef>
+          <a:fillRef idx="3">
+            <a:schemeClr val="accent1"/>
+          </a:fillRef>
+          <a:effectRef idx="2">
+            <a:schemeClr val="accent1"/>
+          </a:effectRef>
+          <a:fontRef idx="minor">
+            <a:schemeClr val="lt1"/>
+          </a:fontRef>
+        </p:style>
+        <p:txBody>
+          <a:bodyPr lIns="0" rIns="0" rtlCol="0" anchor="ctr"/>
+          <a:lstStyle/>
+          <a:p>
+            <a:pPr algn="ctr"/>
+            <a:r>
+              <a:rPr lang="en-US" dirty="0">
+                <a:solidFill>
+                  <a:schemeClr val="tx1"/>
+                </a:solidFill>
+              </a:rPr>
+              <a:t>Outside</a:t>
+            </a:r>
+          </a:p>
+        </p:txBody>
+      </p:sp>
+      <p:sp>
+        <p:nvSpPr>
+          <p:cNvPr id="22" name="Cloud 21">
+            <a:extLst>
+              <a:ext uri="{FF2B5EF4-FFF2-40B4-BE49-F238E27FC236}">
+                <a16:creationId xmlns:a16="http://schemas.microsoft.com/office/drawing/2014/main" id="{09B02587-D073-4F9A-BCEA-01621FBAE694}"/>
+              </a:ext>
+            </a:extLst>
+          </p:cNvPr>
+          <p:cNvSpPr/>
+          <p:nvPr/>
+        </p:nvSpPr>
+        <p:spPr>
+          <a:xfrm>
+            <a:off x="5117922" y="4361383"/>
+            <a:ext cx="1373453" cy="839972"/>
+          </a:xfrm>
+          <a:prstGeom prst="cloud">
+            <a:avLst/>
+          </a:prstGeom>
+          <a:noFill/>
+          <a:ln w="12700">
+            <a:solidFill>
+              <a:srgbClr val="0A60A3"/>
+            </a:solidFill>
+          </a:ln>
+          <a:effectLst/>
+        </p:spPr>
+        <p:style>
+          <a:lnRef idx="1">
+            <a:schemeClr val="accent1"/>
+          </a:lnRef>
+          <a:fillRef idx="3">
+            <a:schemeClr val="accent1"/>
+          </a:fillRef>
+          <a:effectRef idx="2">
+            <a:schemeClr val="accent1"/>
+          </a:effectRef>
+          <a:fontRef idx="minor">
+            <a:schemeClr val="lt1"/>
+          </a:fontRef>
+        </p:style>
+        <p:txBody>
+          <a:bodyPr lIns="0" rIns="0" rtlCol="0" anchor="ctr"/>
+          <a:lstStyle/>
+          <a:p>
+            <a:pPr algn="ctr"/>
+            <a:r>
+              <a:rPr lang="en-US" dirty="0">
+                <a:solidFill>
+                  <a:schemeClr val="tx1"/>
+                </a:solidFill>
+              </a:rPr>
+              <a:t>Outside</a:t>
+            </a:r>
+          </a:p>
+        </p:txBody>
+      </p:sp>
+      <p:sp>
+        <p:nvSpPr>
+          <p:cNvPr id="23" name="Up Arrow 20">
+            <a:extLst>
+              <a:ext uri="{FF2B5EF4-FFF2-40B4-BE49-F238E27FC236}">
+                <a16:creationId xmlns:a16="http://schemas.microsoft.com/office/drawing/2014/main" id="{A68F2FA6-0C89-4906-9937-FED90954453C}"/>
+              </a:ext>
+            </a:extLst>
+          </p:cNvPr>
+          <p:cNvSpPr/>
+          <p:nvPr/>
+        </p:nvSpPr>
+        <p:spPr>
+          <a:xfrm>
+            <a:off x="1128865" y="3826648"/>
+            <a:ext cx="251671" cy="680885"/>
+          </a:xfrm>
+          <a:prstGeom prst="upArrow">
+            <a:avLst/>
+          </a:prstGeom>
+          <a:solidFill>
+            <a:schemeClr val="bg2">
+              <a:lumMod val="75000"/>
+            </a:schemeClr>
+          </a:solidFill>
+          <a:ln>
+            <a:noFill/>
+          </a:ln>
+          <a:effectLst>
+            <a:outerShdw blurRad="50800" dist="38100" dir="2700000" algn="tl" rotWithShape="0">
+              <a:prstClr val="black">
+                <a:alpha val="40000"/>
+              </a:prstClr>
+            </a:outerShdw>
+          </a:effectLst>
+        </p:spPr>
+        <p:style>
+          <a:lnRef idx="1">
+            <a:schemeClr val="accent1"/>
+          </a:lnRef>
+          <a:fillRef idx="3">
+            <a:schemeClr val="accent1"/>
+          </a:fillRef>
+          <a:effectRef idx="2">
+            <a:schemeClr val="accent1"/>
+          </a:effectRef>
+          <a:fontRef idx="minor">
+            <a:schemeClr val="lt1"/>
+          </a:fontRef>
+        </p:style>
+        <p:txBody>
+          <a:bodyPr rtlCol="0" anchor="ctr"/>
+          <a:lstStyle/>
+          <a:p>
+            <a:pPr algn="ctr"/>
+            <a:endParaRPr lang="en-US"/>
+          </a:p>
+        </p:txBody>
+      </p:sp>
+      <p:sp>
+        <p:nvSpPr>
+          <p:cNvPr id="24" name="Up Arrow 21">
+            <a:extLst>
+              <a:ext uri="{FF2B5EF4-FFF2-40B4-BE49-F238E27FC236}">
+                <a16:creationId xmlns:a16="http://schemas.microsoft.com/office/drawing/2014/main" id="{D68BCC7F-FC49-40A6-AF7A-82C4B8783470}"/>
+              </a:ext>
+            </a:extLst>
+          </p:cNvPr>
+          <p:cNvSpPr/>
+          <p:nvPr/>
+        </p:nvSpPr>
+        <p:spPr>
+          <a:xfrm rot="10800000">
+            <a:off x="5762484" y="3823623"/>
+            <a:ext cx="251671" cy="680885"/>
+          </a:xfrm>
+          <a:prstGeom prst="upArrow">
+            <a:avLst/>
+          </a:prstGeom>
+          <a:solidFill>
+            <a:schemeClr val="bg2">
+              <a:lumMod val="75000"/>
+            </a:schemeClr>
+          </a:solidFill>
+          <a:ln>
+            <a:noFill/>
+          </a:ln>
+          <a:effectLst>
+            <a:outerShdw blurRad="50800" dist="38100" dir="2700000" algn="tl" rotWithShape="0">
+              <a:prstClr val="black">
+                <a:alpha val="40000"/>
+              </a:prstClr>
+            </a:outerShdw>
+          </a:effectLst>
+        </p:spPr>
+        <p:style>
+          <a:lnRef idx="1">
+            <a:schemeClr val="accent1"/>
+          </a:lnRef>
+          <a:fillRef idx="3">
+            <a:schemeClr val="accent1"/>
+          </a:fillRef>
+          <a:effectRef idx="2">
+            <a:schemeClr val="accent1"/>
+          </a:effectRef>
+          <a:fontRef idx="minor">
+            <a:schemeClr val="lt1"/>
+          </a:fontRef>
+        </p:style>
+        <p:txBody>
+          <a:bodyPr rtlCol="0" anchor="ctr"/>
+          <a:lstStyle/>
+          <a:p>
+            <a:pPr algn="ctr"/>
+            <a:endParaRPr lang="en-US"/>
+          </a:p>
+        </p:txBody>
+      </p:sp>
+      <p:sp>
+        <p:nvSpPr>
+          <p:cNvPr id="27" name="Up Arrow 10">
+            <a:extLst>
+              <a:ext uri="{FF2B5EF4-FFF2-40B4-BE49-F238E27FC236}">
+                <a16:creationId xmlns:a16="http://schemas.microsoft.com/office/drawing/2014/main" id="{62E99CE7-AF3E-42A9-AE95-2940A292B10F}"/>
+              </a:ext>
+            </a:extLst>
+          </p:cNvPr>
+          <p:cNvSpPr/>
+          <p:nvPr/>
+        </p:nvSpPr>
+        <p:spPr>
+          <a:xfrm rot="5400000">
+            <a:off x="4689142" y="3097288"/>
+            <a:ext cx="251671" cy="680885"/>
+          </a:xfrm>
+          <a:prstGeom prst="upArrow">
+            <a:avLst/>
+          </a:prstGeom>
+          <a:solidFill>
+            <a:schemeClr val="accent1"/>
+          </a:solidFill>
+          <a:ln>
+            <a:noFill/>
+          </a:ln>
+          <a:effectLst>
+            <a:outerShdw blurRad="50800" dist="38100" dir="2700000" algn="tl" rotWithShape="0">
+              <a:prstClr val="black">
+                <a:alpha val="40000"/>
+              </a:prstClr>
+            </a:outerShdw>
+          </a:effectLst>
+        </p:spPr>
+        <p:style>
+          <a:lnRef idx="1">
+            <a:schemeClr val="accent1"/>
+          </a:lnRef>
+          <a:fillRef idx="3">
+            <a:schemeClr val="accent1"/>
+          </a:fillRef>
+          <a:effectRef idx="2">
+            <a:schemeClr val="accent1"/>
+          </a:effectRef>
+          <a:fontRef idx="minor">
+            <a:schemeClr val="lt1"/>
+          </a:fontRef>
+        </p:style>
+        <p:txBody>
+          <a:bodyPr rtlCol="0" anchor="ctr"/>
+          <a:lstStyle/>
+          <a:p>
+            <a:pPr algn="ctr"/>
+            <a:endParaRPr lang="en-US"/>
+          </a:p>
+        </p:txBody>
+      </p:sp>
+      <p:sp>
+        <p:nvSpPr>
+          <p:cNvPr id="28" name="Rounded Rectangle 3">
+            <a:extLst>
+              <a:ext uri="{FF2B5EF4-FFF2-40B4-BE49-F238E27FC236}">
+                <a16:creationId xmlns:a16="http://schemas.microsoft.com/office/drawing/2014/main" id="{7CC7B42D-4BD3-4843-B649-D1D2C51AC315}"/>
+              </a:ext>
+            </a:extLst>
+          </p:cNvPr>
+          <p:cNvSpPr/>
+          <p:nvPr/>
+        </p:nvSpPr>
+        <p:spPr>
+          <a:xfrm>
+            <a:off x="7490956" y="3068104"/>
             <a:ext cx="1828800" cy="771787"/>
+          </a:xfrm>
+          <a:prstGeom prst="roundRect">
+            <a:avLst/>
+          </a:prstGeom>
+          <a:solidFill>
+            <a:schemeClr val="tx2">
+              <a:lumMod val="50000"/>
+            </a:schemeClr>
+          </a:solidFill>
+          <a:ln w="28575">
+            <a:solidFill>
+              <a:schemeClr val="tx1"/>
+            </a:solidFill>
+          </a:ln>
+          <a:effectLst>
+            <a:outerShdw blurRad="50800" dist="38100" dir="2700000" algn="tl" rotWithShape="0">
+              <a:prstClr val="black">
+                <a:alpha val="40000"/>
+              </a:prstClr>
+            </a:outerShdw>
+          </a:effectLst>
+        </p:spPr>
+        <p:style>
+          <a:lnRef idx="1">
+            <a:schemeClr val="accent1"/>
+          </a:lnRef>
+          <a:fillRef idx="3">
+            <a:schemeClr val="accent1"/>
+          </a:fillRef>
+          <a:effectRef idx="2">
+            <a:schemeClr val="accent1"/>
+          </a:effectRef>
+          <a:fontRef idx="minor">
+            <a:schemeClr val="lt1"/>
+          </a:fontRef>
+        </p:style>
+        <p:txBody>
+          <a:bodyPr rtlCol="0" anchor="ctr"/>
+          <a:lstStyle/>
+          <a:p>
+            <a:pPr algn="ctr"/>
+            <a:r>
+              <a:rPr lang="en-US" dirty="0"/>
+              <a:t>Custom Input And Process</a:t>
+            </a:r>
+          </a:p>
+        </p:txBody>
+      </p:sp>
+      <p:sp>
+        <p:nvSpPr>
+          <p:cNvPr id="30" name="Rounded Rectangle 5">
+            <a:extLst>
+              <a:ext uri="{FF2B5EF4-FFF2-40B4-BE49-F238E27FC236}">
+                <a16:creationId xmlns:a16="http://schemas.microsoft.com/office/drawing/2014/main" id="{0B903C28-4763-4F90-A3ED-ECBCE2F72FF9}"/>
+              </a:ext>
+            </a:extLst>
+          </p:cNvPr>
+          <p:cNvSpPr/>
+          <p:nvPr/>
+        </p:nvSpPr>
+        <p:spPr>
+          <a:xfrm>
+            <a:off x="9822187" y="3051835"/>
+            <a:ext cx="1828800" cy="771787"/>
+          </a:xfrm>
+          <a:prstGeom prst="roundRect">
+            <a:avLst/>
+          </a:prstGeom>
+          <a:solidFill>
+            <a:schemeClr val="tx2">
+              <a:lumMod val="50000"/>
+            </a:schemeClr>
+          </a:solidFill>
+          <a:ln w="28575">
+            <a:solidFill>
+              <a:schemeClr val="tx1"/>
+            </a:solidFill>
+          </a:ln>
+          <a:effectLst>
+            <a:outerShdw blurRad="50800" dist="38100" dir="2700000" algn="tl" rotWithShape="0">
+              <a:prstClr val="black">
+                <a:alpha val="40000"/>
+              </a:prstClr>
+            </a:outerShdw>
+          </a:effectLst>
+        </p:spPr>
+        <p:style>
+          <a:lnRef idx="1">
+            <a:schemeClr val="accent1"/>
+          </a:lnRef>
+          <a:fillRef idx="3">
+            <a:schemeClr val="accent1"/>
+          </a:fillRef>
+          <a:effectRef idx="2">
+            <a:schemeClr val="accent1"/>
+          </a:effectRef>
+          <a:fontRef idx="minor">
+            <a:schemeClr val="lt1"/>
+          </a:fontRef>
+        </p:style>
+        <p:txBody>
+          <a:bodyPr rtlCol="0" anchor="ctr"/>
+          <a:lstStyle/>
+          <a:p>
+            <a:pPr algn="ctr"/>
+            <a:r>
+              <a:rPr lang="en-US" dirty="0"/>
+              <a:t>Scan Engine Module</a:t>
+            </a:r>
+          </a:p>
+        </p:txBody>
+      </p:sp>
+      <p:sp>
+        <p:nvSpPr>
+          <p:cNvPr id="31" name="Rounded Rectangle 6">
+            <a:extLst>
+              <a:ext uri="{FF2B5EF4-FFF2-40B4-BE49-F238E27FC236}">
+                <a16:creationId xmlns:a16="http://schemas.microsoft.com/office/drawing/2014/main" id="{AFF795A6-D376-453A-A277-8A8D3F27E28E}"/>
+              </a:ext>
+            </a:extLst>
+          </p:cNvPr>
+          <p:cNvSpPr/>
+          <p:nvPr/>
+        </p:nvSpPr>
+        <p:spPr>
+          <a:xfrm>
+            <a:off x="7468203" y="2161309"/>
+            <a:ext cx="4182784" cy="771787"/>
           </a:xfrm>
           <a:prstGeom prst="roundRect">
             <a:avLst/>
@@ -10064,17 +12011,17 @@
             <a:pPr algn="ctr"/>
             <a:r>
               <a:rPr lang="en-US" dirty="0"/>
-              <a:t>Custom Process Module 1</a:t>
-            </a:r>
-          </a:p>
-        </p:txBody>
-      </p:sp>
-      <p:sp>
-        <p:nvSpPr>
-          <p:cNvPr id="14" name="Rounded Rectangle 5">
+              <a:t>Engine</a:t>
+            </a:r>
+          </a:p>
+        </p:txBody>
+      </p:sp>
+      <p:sp>
+        <p:nvSpPr>
+          <p:cNvPr id="32" name="Up Arrow 10">
             <a:extLst>
               <a:ext uri="{FF2B5EF4-FFF2-40B4-BE49-F238E27FC236}">
-                <a16:creationId xmlns:a16="http://schemas.microsoft.com/office/drawing/2014/main" id="{AC7AE688-9FA1-4E17-8726-8DE82A9C07BB}"/>
+                <a16:creationId xmlns:a16="http://schemas.microsoft.com/office/drawing/2014/main" id="{E1A389EB-BBC6-4B8E-810F-A0D4A178D4BB}"/>
               </a:ext>
             </a:extLst>
           </p:cNvPr>
@@ -10082,132 +12029,8 @@
           <p:nvPr/>
         </p:nvSpPr>
         <p:spPr>
-          <a:xfrm>
-            <a:off x="4916429" y="4192400"/>
-            <a:ext cx="1828800" cy="771787"/>
-          </a:xfrm>
-          <a:prstGeom prst="roundRect">
-            <a:avLst/>
-          </a:prstGeom>
-          <a:solidFill>
-            <a:srgbClr val="C00000"/>
-          </a:solidFill>
-          <a:ln w="28575">
-            <a:solidFill>
-              <a:schemeClr val="tx1"/>
-            </a:solidFill>
-          </a:ln>
-          <a:effectLst>
-            <a:outerShdw blurRad="50800" dist="38100" dir="2700000" algn="tl" rotWithShape="0">
-              <a:prstClr val="black">
-                <a:alpha val="40000"/>
-              </a:prstClr>
-            </a:outerShdw>
-          </a:effectLst>
-        </p:spPr>
-        <p:style>
-          <a:lnRef idx="1">
-            <a:schemeClr val="accent1"/>
-          </a:lnRef>
-          <a:fillRef idx="3">
-            <a:schemeClr val="accent1"/>
-          </a:fillRef>
-          <a:effectRef idx="2">
-            <a:schemeClr val="accent1"/>
-          </a:effectRef>
-          <a:fontRef idx="minor">
-            <a:schemeClr val="lt1"/>
-          </a:fontRef>
-        </p:style>
-        <p:txBody>
-          <a:bodyPr rtlCol="0" anchor="ctr"/>
-          <a:lstStyle/>
-          <a:p>
-            <a:pPr algn="ctr"/>
-            <a:r>
-              <a:rPr lang="en-US" dirty="0"/>
-              <a:t>Scan Engine Module</a:t>
-            </a:r>
-          </a:p>
-        </p:txBody>
-      </p:sp>
-      <p:sp>
-        <p:nvSpPr>
-          <p:cNvPr id="15" name="Rounded Rectangle 6">
-            <a:extLst>
-              <a:ext uri="{FF2B5EF4-FFF2-40B4-BE49-F238E27FC236}">
-                <a16:creationId xmlns:a16="http://schemas.microsoft.com/office/drawing/2014/main" id="{175EFA03-0F68-4E83-A963-597CBB5A67DF}"/>
-              </a:ext>
-            </a:extLst>
-          </p:cNvPr>
-          <p:cNvSpPr/>
-          <p:nvPr/>
-        </p:nvSpPr>
-        <p:spPr>
-          <a:xfrm>
-            <a:off x="294868" y="3301873"/>
-            <a:ext cx="6450362" cy="771787"/>
-          </a:xfrm>
-          <a:prstGeom prst="roundRect">
-            <a:avLst/>
-          </a:prstGeom>
-          <a:solidFill>
-            <a:srgbClr val="007200"/>
-          </a:solidFill>
-          <a:ln w="28575">
-            <a:solidFill>
-              <a:schemeClr val="tx1"/>
-            </a:solidFill>
-          </a:ln>
-          <a:effectLst>
-            <a:outerShdw blurRad="50800" dist="38100" dir="2700000" algn="tl" rotWithShape="0">
-              <a:prstClr val="black">
-                <a:alpha val="40000"/>
-              </a:prstClr>
-            </a:outerShdw>
-          </a:effectLst>
-        </p:spPr>
-        <p:style>
-          <a:lnRef idx="1">
-            <a:schemeClr val="accent1"/>
-          </a:lnRef>
-          <a:fillRef idx="3">
-            <a:schemeClr val="accent1"/>
-          </a:fillRef>
-          <a:effectRef idx="2">
-            <a:schemeClr val="accent1"/>
-          </a:effectRef>
-          <a:fontRef idx="minor">
-            <a:schemeClr val="lt1"/>
-          </a:fontRef>
-        </p:style>
-        <p:txBody>
-          <a:bodyPr rtlCol="0" anchor="ctr"/>
-          <a:lstStyle/>
-          <a:p>
-            <a:pPr algn="ctr"/>
-            <a:r>
-              <a:rPr lang="en-US" dirty="0"/>
-              <a:t>Engine</a:t>
-            </a:r>
-          </a:p>
-        </p:txBody>
-      </p:sp>
-      <p:sp>
-        <p:nvSpPr>
-          <p:cNvPr id="19" name="Up Arrow 10">
-            <a:extLst>
-              <a:ext uri="{FF2B5EF4-FFF2-40B4-BE49-F238E27FC236}">
-                <a16:creationId xmlns:a16="http://schemas.microsoft.com/office/drawing/2014/main" id="{2607A99D-61B4-467E-BBED-0AA7D97CB935}"/>
-              </a:ext>
-            </a:extLst>
-          </p:cNvPr>
-          <p:cNvSpPr/>
-          <p:nvPr/>
-        </p:nvSpPr>
-        <p:spPr>
           <a:xfrm rot="5400000">
-            <a:off x="2326662" y="4237852"/>
+            <a:off x="9445136" y="3113554"/>
             <a:ext cx="251671" cy="680885"/>
           </a:xfrm>
           <a:prstGeom prst="upArrow">
@@ -10252,10 +12075,10 @@
       </p:sp>
       <p:sp>
         <p:nvSpPr>
-          <p:cNvPr id="21" name="Cloud 20">
+          <p:cNvPr id="33" name="Cloud 32">
             <a:extLst>
               <a:ext uri="{FF2B5EF4-FFF2-40B4-BE49-F238E27FC236}">
-                <a16:creationId xmlns:a16="http://schemas.microsoft.com/office/drawing/2014/main" id="{90E59BB9-204E-4888-8718-CEF2A224153E}"/>
+                <a16:creationId xmlns:a16="http://schemas.microsoft.com/office/drawing/2014/main" id="{C2E753F2-BEB5-4C4A-AEDC-FA5ACD0D966C}"/>
               </a:ext>
             </a:extLst>
           </p:cNvPr>
@@ -10264,7 +12087,7 @@
         </p:nvSpPr>
         <p:spPr>
           <a:xfrm>
-            <a:off x="522540" y="5501947"/>
+            <a:off x="7695876" y="4361383"/>
             <a:ext cx="1373453" cy="839972"/>
           </a:xfrm>
           <a:prstGeom prst="cloud">
@@ -10310,10 +12133,10 @@
       </p:sp>
       <p:sp>
         <p:nvSpPr>
-          <p:cNvPr id="22" name="Cloud 21">
+          <p:cNvPr id="34" name="Cloud 33">
             <a:extLst>
               <a:ext uri="{FF2B5EF4-FFF2-40B4-BE49-F238E27FC236}">
-                <a16:creationId xmlns:a16="http://schemas.microsoft.com/office/drawing/2014/main" id="{09B02587-D073-4F9A-BCEA-01621FBAE694}"/>
+                <a16:creationId xmlns:a16="http://schemas.microsoft.com/office/drawing/2014/main" id="{FEC2E4AB-6521-481F-ADFC-4964E1CACE33}"/>
               </a:ext>
             </a:extLst>
           </p:cNvPr>
@@ -10322,7 +12145,7 @@
         </p:nvSpPr>
         <p:spPr>
           <a:xfrm>
-            <a:off x="5136395" y="5501947"/>
+            <a:off x="10049860" y="4344418"/>
             <a:ext cx="1373453" cy="839972"/>
           </a:xfrm>
           <a:prstGeom prst="cloud">
@@ -10368,10 +12191,10 @@
       </p:sp>
       <p:sp>
         <p:nvSpPr>
-          <p:cNvPr id="23" name="Up Arrow 20">
+          <p:cNvPr id="35" name="Up Arrow 20">
             <a:extLst>
               <a:ext uri="{FF2B5EF4-FFF2-40B4-BE49-F238E27FC236}">
-                <a16:creationId xmlns:a16="http://schemas.microsoft.com/office/drawing/2014/main" id="{A68F2FA6-0C89-4906-9937-FED90954453C}"/>
+                <a16:creationId xmlns:a16="http://schemas.microsoft.com/office/drawing/2014/main" id="{2A061AF9-629F-47D4-9B2F-43A12A96C8D4}"/>
               </a:ext>
             </a:extLst>
           </p:cNvPr>
@@ -10380,7 +12203,7 @@
         </p:nvSpPr>
         <p:spPr>
           <a:xfrm>
-            <a:off x="1147338" y="4967212"/>
+            <a:off x="8320674" y="3826648"/>
             <a:ext cx="251671" cy="680885"/>
           </a:xfrm>
           <a:prstGeom prst="upArrow">
@@ -10427,540 +12250,6 @@
       </p:sp>
       <p:sp>
         <p:nvSpPr>
-          <p:cNvPr id="24" name="Up Arrow 21">
-            <a:extLst>
-              <a:ext uri="{FF2B5EF4-FFF2-40B4-BE49-F238E27FC236}">
-                <a16:creationId xmlns:a16="http://schemas.microsoft.com/office/drawing/2014/main" id="{D68BCC7F-FC49-40A6-AF7A-82C4B8783470}"/>
-              </a:ext>
-            </a:extLst>
-          </p:cNvPr>
-          <p:cNvSpPr/>
-          <p:nvPr/>
-        </p:nvSpPr>
-        <p:spPr>
-          <a:xfrm rot="10800000">
-            <a:off x="5780957" y="4964187"/>
-            <a:ext cx="251671" cy="680885"/>
-          </a:xfrm>
-          <a:prstGeom prst="upArrow">
-            <a:avLst/>
-          </a:prstGeom>
-          <a:solidFill>
-            <a:schemeClr val="bg2">
-              <a:lumMod val="75000"/>
-            </a:schemeClr>
-          </a:solidFill>
-          <a:ln>
-            <a:noFill/>
-          </a:ln>
-          <a:effectLst>
-            <a:outerShdw blurRad="50800" dist="38100" dir="2700000" algn="tl" rotWithShape="0">
-              <a:prstClr val="black">
-                <a:alpha val="40000"/>
-              </a:prstClr>
-            </a:outerShdw>
-          </a:effectLst>
-        </p:spPr>
-        <p:style>
-          <a:lnRef idx="1">
-            <a:schemeClr val="accent1"/>
-          </a:lnRef>
-          <a:fillRef idx="3">
-            <a:schemeClr val="accent1"/>
-          </a:fillRef>
-          <a:effectRef idx="2">
-            <a:schemeClr val="accent1"/>
-          </a:effectRef>
-          <a:fontRef idx="minor">
-            <a:schemeClr val="lt1"/>
-          </a:fontRef>
-        </p:style>
-        <p:txBody>
-          <a:bodyPr rtlCol="0" anchor="ctr"/>
-          <a:lstStyle/>
-          <a:p>
-            <a:pPr algn="ctr"/>
-            <a:endParaRPr lang="en-US"/>
-          </a:p>
-        </p:txBody>
-      </p:sp>
-      <p:sp>
-        <p:nvSpPr>
-          <p:cNvPr id="27" name="Up Arrow 10">
-            <a:extLst>
-              <a:ext uri="{FF2B5EF4-FFF2-40B4-BE49-F238E27FC236}">
-                <a16:creationId xmlns:a16="http://schemas.microsoft.com/office/drawing/2014/main" id="{62E99CE7-AF3E-42A9-AE95-2940A292B10F}"/>
-              </a:ext>
-            </a:extLst>
-          </p:cNvPr>
-          <p:cNvSpPr/>
-          <p:nvPr/>
-        </p:nvSpPr>
-        <p:spPr>
-          <a:xfrm rot="5400000">
-            <a:off x="4707615" y="4237852"/>
-            <a:ext cx="251671" cy="680885"/>
-          </a:xfrm>
-          <a:prstGeom prst="upArrow">
-            <a:avLst/>
-          </a:prstGeom>
-          <a:solidFill>
-            <a:schemeClr val="accent1"/>
-          </a:solidFill>
-          <a:ln>
-            <a:noFill/>
-          </a:ln>
-          <a:effectLst>
-            <a:outerShdw blurRad="50800" dist="38100" dir="2700000" algn="tl" rotWithShape="0">
-              <a:prstClr val="black">
-                <a:alpha val="40000"/>
-              </a:prstClr>
-            </a:outerShdw>
-          </a:effectLst>
-        </p:spPr>
-        <p:style>
-          <a:lnRef idx="1">
-            <a:schemeClr val="accent1"/>
-          </a:lnRef>
-          <a:fillRef idx="3">
-            <a:schemeClr val="accent1"/>
-          </a:fillRef>
-          <a:effectRef idx="2">
-            <a:schemeClr val="accent1"/>
-          </a:effectRef>
-          <a:fontRef idx="minor">
-            <a:schemeClr val="lt1"/>
-          </a:fontRef>
-        </p:style>
-        <p:txBody>
-          <a:bodyPr rtlCol="0" anchor="ctr"/>
-          <a:lstStyle/>
-          <a:p>
-            <a:pPr algn="ctr"/>
-            <a:endParaRPr lang="en-US"/>
-          </a:p>
-        </p:txBody>
-      </p:sp>
-      <p:sp>
-        <p:nvSpPr>
-          <p:cNvPr id="28" name="Rounded Rectangle 3">
-            <a:extLst>
-              <a:ext uri="{FF2B5EF4-FFF2-40B4-BE49-F238E27FC236}">
-                <a16:creationId xmlns:a16="http://schemas.microsoft.com/office/drawing/2014/main" id="{7CC7B42D-4BD3-4843-B649-D1D2C51AC315}"/>
-              </a:ext>
-            </a:extLst>
-          </p:cNvPr>
-          <p:cNvSpPr/>
-          <p:nvPr/>
-        </p:nvSpPr>
-        <p:spPr>
-          <a:xfrm>
-            <a:off x="7509429" y="4208668"/>
-            <a:ext cx="1828800" cy="771787"/>
-          </a:xfrm>
-          <a:prstGeom prst="roundRect">
-            <a:avLst/>
-          </a:prstGeom>
-          <a:solidFill>
-            <a:srgbClr val="C00000"/>
-          </a:solidFill>
-          <a:ln w="28575">
-            <a:solidFill>
-              <a:schemeClr val="tx1"/>
-            </a:solidFill>
-          </a:ln>
-          <a:effectLst>
-            <a:outerShdw blurRad="50800" dist="38100" dir="2700000" algn="tl" rotWithShape="0">
-              <a:prstClr val="black">
-                <a:alpha val="40000"/>
-              </a:prstClr>
-            </a:outerShdw>
-          </a:effectLst>
-        </p:spPr>
-        <p:style>
-          <a:lnRef idx="1">
-            <a:schemeClr val="accent1"/>
-          </a:lnRef>
-          <a:fillRef idx="3">
-            <a:schemeClr val="accent1"/>
-          </a:fillRef>
-          <a:effectRef idx="2">
-            <a:schemeClr val="accent1"/>
-          </a:effectRef>
-          <a:fontRef idx="minor">
-            <a:schemeClr val="lt1"/>
-          </a:fontRef>
-        </p:style>
-        <p:txBody>
-          <a:bodyPr rtlCol="0" anchor="ctr"/>
-          <a:lstStyle/>
-          <a:p>
-            <a:pPr algn="ctr"/>
-            <a:r>
-              <a:rPr lang="en-US" dirty="0"/>
-              <a:t>Custom Input And Process</a:t>
-            </a:r>
-          </a:p>
-        </p:txBody>
-      </p:sp>
-      <p:sp>
-        <p:nvSpPr>
-          <p:cNvPr id="30" name="Rounded Rectangle 5">
-            <a:extLst>
-              <a:ext uri="{FF2B5EF4-FFF2-40B4-BE49-F238E27FC236}">
-                <a16:creationId xmlns:a16="http://schemas.microsoft.com/office/drawing/2014/main" id="{0B903C28-4763-4F90-A3ED-ECBCE2F72FF9}"/>
-              </a:ext>
-            </a:extLst>
-          </p:cNvPr>
-          <p:cNvSpPr/>
-          <p:nvPr/>
-        </p:nvSpPr>
-        <p:spPr>
-          <a:xfrm>
-            <a:off x="9840660" y="4192399"/>
-            <a:ext cx="1828800" cy="771787"/>
-          </a:xfrm>
-          <a:prstGeom prst="roundRect">
-            <a:avLst/>
-          </a:prstGeom>
-          <a:solidFill>
-            <a:srgbClr val="C00000"/>
-          </a:solidFill>
-          <a:ln w="28575">
-            <a:solidFill>
-              <a:schemeClr val="tx1"/>
-            </a:solidFill>
-          </a:ln>
-          <a:effectLst>
-            <a:outerShdw blurRad="50800" dist="38100" dir="2700000" algn="tl" rotWithShape="0">
-              <a:prstClr val="black">
-                <a:alpha val="40000"/>
-              </a:prstClr>
-            </a:outerShdw>
-          </a:effectLst>
-        </p:spPr>
-        <p:style>
-          <a:lnRef idx="1">
-            <a:schemeClr val="accent1"/>
-          </a:lnRef>
-          <a:fillRef idx="3">
-            <a:schemeClr val="accent1"/>
-          </a:fillRef>
-          <a:effectRef idx="2">
-            <a:schemeClr val="accent1"/>
-          </a:effectRef>
-          <a:fontRef idx="minor">
-            <a:schemeClr val="lt1"/>
-          </a:fontRef>
-        </p:style>
-        <p:txBody>
-          <a:bodyPr rtlCol="0" anchor="ctr"/>
-          <a:lstStyle/>
-          <a:p>
-            <a:pPr algn="ctr"/>
-            <a:r>
-              <a:rPr lang="en-US" dirty="0"/>
-              <a:t>Scan Engine Module</a:t>
-            </a:r>
-          </a:p>
-        </p:txBody>
-      </p:sp>
-      <p:sp>
-        <p:nvSpPr>
-          <p:cNvPr id="31" name="Rounded Rectangle 6">
-            <a:extLst>
-              <a:ext uri="{FF2B5EF4-FFF2-40B4-BE49-F238E27FC236}">
-                <a16:creationId xmlns:a16="http://schemas.microsoft.com/office/drawing/2014/main" id="{AFF795A6-D376-453A-A277-8A8D3F27E28E}"/>
-              </a:ext>
-            </a:extLst>
-          </p:cNvPr>
-          <p:cNvSpPr/>
-          <p:nvPr/>
-        </p:nvSpPr>
-        <p:spPr>
-          <a:xfrm>
-            <a:off x="7486676" y="3301873"/>
-            <a:ext cx="4182784" cy="771787"/>
-          </a:xfrm>
-          <a:prstGeom prst="roundRect">
-            <a:avLst/>
-          </a:prstGeom>
-          <a:solidFill>
-            <a:srgbClr val="007200"/>
-          </a:solidFill>
-          <a:ln w="28575">
-            <a:solidFill>
-              <a:schemeClr val="tx1"/>
-            </a:solidFill>
-          </a:ln>
-          <a:effectLst>
-            <a:outerShdw blurRad="50800" dist="38100" dir="2700000" algn="tl" rotWithShape="0">
-              <a:prstClr val="black">
-                <a:alpha val="40000"/>
-              </a:prstClr>
-            </a:outerShdw>
-          </a:effectLst>
-        </p:spPr>
-        <p:style>
-          <a:lnRef idx="1">
-            <a:schemeClr val="accent1"/>
-          </a:lnRef>
-          <a:fillRef idx="3">
-            <a:schemeClr val="accent1"/>
-          </a:fillRef>
-          <a:effectRef idx="2">
-            <a:schemeClr val="accent1"/>
-          </a:effectRef>
-          <a:fontRef idx="minor">
-            <a:schemeClr val="lt1"/>
-          </a:fontRef>
-        </p:style>
-        <p:txBody>
-          <a:bodyPr rtlCol="0" anchor="ctr"/>
-          <a:lstStyle/>
-          <a:p>
-            <a:pPr algn="ctr"/>
-            <a:r>
-              <a:rPr lang="en-US" dirty="0"/>
-              <a:t>Engine</a:t>
-            </a:r>
-          </a:p>
-        </p:txBody>
-      </p:sp>
-      <p:sp>
-        <p:nvSpPr>
-          <p:cNvPr id="32" name="Up Arrow 10">
-            <a:extLst>
-              <a:ext uri="{FF2B5EF4-FFF2-40B4-BE49-F238E27FC236}">
-                <a16:creationId xmlns:a16="http://schemas.microsoft.com/office/drawing/2014/main" id="{E1A389EB-BBC6-4B8E-810F-A0D4A178D4BB}"/>
-              </a:ext>
-            </a:extLst>
-          </p:cNvPr>
-          <p:cNvSpPr/>
-          <p:nvPr/>
-        </p:nvSpPr>
-        <p:spPr>
-          <a:xfrm rot="5400000">
-            <a:off x="9463609" y="4254118"/>
-            <a:ext cx="251671" cy="680885"/>
-          </a:xfrm>
-          <a:prstGeom prst="upArrow">
-            <a:avLst/>
-          </a:prstGeom>
-          <a:solidFill>
-            <a:schemeClr val="accent1"/>
-          </a:solidFill>
-          <a:ln>
-            <a:noFill/>
-          </a:ln>
-          <a:effectLst>
-            <a:outerShdw blurRad="50800" dist="38100" dir="2700000" algn="tl" rotWithShape="0">
-              <a:prstClr val="black">
-                <a:alpha val="40000"/>
-              </a:prstClr>
-            </a:outerShdw>
-          </a:effectLst>
-        </p:spPr>
-        <p:style>
-          <a:lnRef idx="1">
-            <a:schemeClr val="accent1"/>
-          </a:lnRef>
-          <a:fillRef idx="3">
-            <a:schemeClr val="accent1"/>
-          </a:fillRef>
-          <a:effectRef idx="2">
-            <a:schemeClr val="accent1"/>
-          </a:effectRef>
-          <a:fontRef idx="minor">
-            <a:schemeClr val="lt1"/>
-          </a:fontRef>
-        </p:style>
-        <p:txBody>
-          <a:bodyPr rtlCol="0" anchor="ctr"/>
-          <a:lstStyle/>
-          <a:p>
-            <a:pPr algn="ctr"/>
-            <a:endParaRPr lang="en-US"/>
-          </a:p>
-        </p:txBody>
-      </p:sp>
-      <p:sp>
-        <p:nvSpPr>
-          <p:cNvPr id="33" name="Cloud 32">
-            <a:extLst>
-              <a:ext uri="{FF2B5EF4-FFF2-40B4-BE49-F238E27FC236}">
-                <a16:creationId xmlns:a16="http://schemas.microsoft.com/office/drawing/2014/main" id="{C2E753F2-BEB5-4C4A-AEDC-FA5ACD0D966C}"/>
-              </a:ext>
-            </a:extLst>
-          </p:cNvPr>
-          <p:cNvSpPr/>
-          <p:nvPr/>
-        </p:nvSpPr>
-        <p:spPr>
-          <a:xfrm>
-            <a:off x="7714349" y="5501947"/>
-            <a:ext cx="1373453" cy="839972"/>
-          </a:xfrm>
-          <a:prstGeom prst="cloud">
-            <a:avLst/>
-          </a:prstGeom>
-          <a:noFill/>
-          <a:ln w="12700">
-            <a:solidFill>
-              <a:srgbClr val="0A60A3"/>
-            </a:solidFill>
-          </a:ln>
-          <a:effectLst/>
-        </p:spPr>
-        <p:style>
-          <a:lnRef idx="1">
-            <a:schemeClr val="accent1"/>
-          </a:lnRef>
-          <a:fillRef idx="3">
-            <a:schemeClr val="accent1"/>
-          </a:fillRef>
-          <a:effectRef idx="2">
-            <a:schemeClr val="accent1"/>
-          </a:effectRef>
-          <a:fontRef idx="minor">
-            <a:schemeClr val="lt1"/>
-          </a:fontRef>
-        </p:style>
-        <p:txBody>
-          <a:bodyPr lIns="0" rIns="0" rtlCol="0" anchor="ctr"/>
-          <a:lstStyle/>
-          <a:p>
-            <a:pPr algn="ctr"/>
-            <a:r>
-              <a:rPr lang="en-US" dirty="0">
-                <a:solidFill>
-                  <a:schemeClr val="tx1"/>
-                </a:solidFill>
-              </a:rPr>
-              <a:t>Outside</a:t>
-            </a:r>
-          </a:p>
-        </p:txBody>
-      </p:sp>
-      <p:sp>
-        <p:nvSpPr>
-          <p:cNvPr id="34" name="Cloud 33">
-            <a:extLst>
-              <a:ext uri="{FF2B5EF4-FFF2-40B4-BE49-F238E27FC236}">
-                <a16:creationId xmlns:a16="http://schemas.microsoft.com/office/drawing/2014/main" id="{FEC2E4AB-6521-481F-ADFC-4964E1CACE33}"/>
-              </a:ext>
-            </a:extLst>
-          </p:cNvPr>
-          <p:cNvSpPr/>
-          <p:nvPr/>
-        </p:nvSpPr>
-        <p:spPr>
-          <a:xfrm>
-            <a:off x="10068333" y="5484982"/>
-            <a:ext cx="1373453" cy="839972"/>
-          </a:xfrm>
-          <a:prstGeom prst="cloud">
-            <a:avLst/>
-          </a:prstGeom>
-          <a:noFill/>
-          <a:ln w="12700">
-            <a:solidFill>
-              <a:srgbClr val="0A60A3"/>
-            </a:solidFill>
-          </a:ln>
-          <a:effectLst/>
-        </p:spPr>
-        <p:style>
-          <a:lnRef idx="1">
-            <a:schemeClr val="accent1"/>
-          </a:lnRef>
-          <a:fillRef idx="3">
-            <a:schemeClr val="accent1"/>
-          </a:fillRef>
-          <a:effectRef idx="2">
-            <a:schemeClr val="accent1"/>
-          </a:effectRef>
-          <a:fontRef idx="minor">
-            <a:schemeClr val="lt1"/>
-          </a:fontRef>
-        </p:style>
-        <p:txBody>
-          <a:bodyPr lIns="0" rIns="0" rtlCol="0" anchor="ctr"/>
-          <a:lstStyle/>
-          <a:p>
-            <a:pPr algn="ctr"/>
-            <a:r>
-              <a:rPr lang="en-US" dirty="0">
-                <a:solidFill>
-                  <a:schemeClr val="tx1"/>
-                </a:solidFill>
-              </a:rPr>
-              <a:t>Outside</a:t>
-            </a:r>
-          </a:p>
-        </p:txBody>
-      </p:sp>
-      <p:sp>
-        <p:nvSpPr>
-          <p:cNvPr id="35" name="Up Arrow 20">
-            <a:extLst>
-              <a:ext uri="{FF2B5EF4-FFF2-40B4-BE49-F238E27FC236}">
-                <a16:creationId xmlns:a16="http://schemas.microsoft.com/office/drawing/2014/main" id="{2A061AF9-629F-47D4-9B2F-43A12A96C8D4}"/>
-              </a:ext>
-            </a:extLst>
-          </p:cNvPr>
-          <p:cNvSpPr/>
-          <p:nvPr/>
-        </p:nvSpPr>
-        <p:spPr>
-          <a:xfrm>
-            <a:off x="8339147" y="4967212"/>
-            <a:ext cx="251671" cy="680885"/>
-          </a:xfrm>
-          <a:prstGeom prst="upArrow">
-            <a:avLst/>
-          </a:prstGeom>
-          <a:solidFill>
-            <a:schemeClr val="bg2">
-              <a:lumMod val="75000"/>
-            </a:schemeClr>
-          </a:solidFill>
-          <a:ln>
-            <a:noFill/>
-          </a:ln>
-          <a:effectLst>
-            <a:outerShdw blurRad="50800" dist="38100" dir="2700000" algn="tl" rotWithShape="0">
-              <a:prstClr val="black">
-                <a:alpha val="40000"/>
-              </a:prstClr>
-            </a:outerShdw>
-          </a:effectLst>
-        </p:spPr>
-        <p:style>
-          <a:lnRef idx="1">
-            <a:schemeClr val="accent1"/>
-          </a:lnRef>
-          <a:fillRef idx="3">
-            <a:schemeClr val="accent1"/>
-          </a:fillRef>
-          <a:effectRef idx="2">
-            <a:schemeClr val="accent1"/>
-          </a:effectRef>
-          <a:fontRef idx="minor">
-            <a:schemeClr val="lt1"/>
-          </a:fontRef>
-        </p:style>
-        <p:txBody>
-          <a:bodyPr rtlCol="0" anchor="ctr"/>
-          <a:lstStyle/>
-          <a:p>
-            <a:pPr algn="ctr"/>
-            <a:endParaRPr lang="en-US"/>
-          </a:p>
-        </p:txBody>
-      </p:sp>
-      <p:sp>
-        <p:nvSpPr>
           <p:cNvPr id="36" name="Up Arrow 21">
             <a:extLst>
               <a:ext uri="{FF2B5EF4-FFF2-40B4-BE49-F238E27FC236}">
@@ -10973,7 +12262,7 @@
         </p:nvSpPr>
         <p:spPr>
           <a:xfrm rot="10800000">
-            <a:off x="10693704" y="4964186"/>
+            <a:off x="10675231" y="3823622"/>
             <a:ext cx="251671" cy="680885"/>
           </a:xfrm>
           <a:prstGeom prst="upArrow">
@@ -11094,8 +12383,8 @@
         </p:nvSpPr>
         <p:spPr>
           <a:xfrm>
-            <a:off x="838200" y="1825625"/>
-            <a:ext cx="10515600" cy="1864702"/>
+            <a:off x="605367" y="975360"/>
+            <a:ext cx="10972800" cy="971931"/>
           </a:xfrm>
         </p:spPr>
         <p:txBody>
@@ -11138,8 +12427,200 @@
         </p:nvSpPr>
         <p:spPr>
           <a:xfrm>
-            <a:off x="2870818" y="3270985"/>
+            <a:off x="2870818" y="2696876"/>
             <a:ext cx="1828800" cy="771787"/>
+          </a:xfrm>
+          <a:prstGeom prst="roundRect">
+            <a:avLst/>
+          </a:prstGeom>
+          <a:solidFill>
+            <a:schemeClr val="tx2">
+              <a:lumMod val="50000"/>
+            </a:schemeClr>
+          </a:solidFill>
+          <a:ln w="28575">
+            <a:solidFill>
+              <a:schemeClr val="tx1"/>
+            </a:solidFill>
+          </a:ln>
+          <a:effectLst>
+            <a:outerShdw blurRad="50800" dist="38100" dir="2700000" algn="tl" rotWithShape="0">
+              <a:prstClr val="black">
+                <a:alpha val="40000"/>
+              </a:prstClr>
+            </a:outerShdw>
+          </a:effectLst>
+        </p:spPr>
+        <p:style>
+          <a:lnRef idx="1">
+            <a:schemeClr val="accent1"/>
+          </a:lnRef>
+          <a:fillRef idx="3">
+            <a:schemeClr val="accent1"/>
+          </a:fillRef>
+          <a:effectRef idx="2">
+            <a:schemeClr val="accent1"/>
+          </a:effectRef>
+          <a:fontRef idx="minor">
+            <a:schemeClr val="lt1"/>
+          </a:fontRef>
+        </p:style>
+        <p:txBody>
+          <a:bodyPr rtlCol="0" anchor="ctr"/>
+          <a:lstStyle/>
+          <a:p>
+            <a:pPr algn="ctr"/>
+            <a:r>
+              <a:rPr lang="en-US" dirty="0"/>
+              <a:t>Custom Input Module 1</a:t>
+            </a:r>
+          </a:p>
+        </p:txBody>
+      </p:sp>
+      <p:sp>
+        <p:nvSpPr>
+          <p:cNvPr id="13" name="Rounded Rectangle 4">
+            <a:extLst>
+              <a:ext uri="{FF2B5EF4-FFF2-40B4-BE49-F238E27FC236}">
+                <a16:creationId xmlns:a16="http://schemas.microsoft.com/office/drawing/2014/main" id="{DF97D33A-496D-415C-9003-D9090F872DE8}"/>
+              </a:ext>
+            </a:extLst>
+          </p:cNvPr>
+          <p:cNvSpPr/>
+          <p:nvPr/>
+        </p:nvSpPr>
+        <p:spPr>
+          <a:xfrm>
+            <a:off x="5240159" y="2675633"/>
+            <a:ext cx="1828800" cy="771787"/>
+          </a:xfrm>
+          <a:prstGeom prst="roundRect">
+            <a:avLst/>
+          </a:prstGeom>
+          <a:solidFill>
+            <a:schemeClr val="accent6">
+              <a:lumMod val="75000"/>
+            </a:schemeClr>
+          </a:solidFill>
+          <a:ln w="28575">
+            <a:solidFill>
+              <a:schemeClr val="tx1"/>
+            </a:solidFill>
+          </a:ln>
+          <a:effectLst>
+            <a:outerShdw blurRad="50800" dist="38100" dir="2700000" algn="tl" rotWithShape="0">
+              <a:prstClr val="black">
+                <a:alpha val="40000"/>
+              </a:prstClr>
+            </a:outerShdw>
+          </a:effectLst>
+        </p:spPr>
+        <p:style>
+          <a:lnRef idx="1">
+            <a:schemeClr val="accent1"/>
+          </a:lnRef>
+          <a:fillRef idx="3">
+            <a:schemeClr val="accent1"/>
+          </a:fillRef>
+          <a:effectRef idx="2">
+            <a:schemeClr val="accent1"/>
+          </a:effectRef>
+          <a:fontRef idx="minor">
+            <a:schemeClr val="lt1"/>
+          </a:fontRef>
+        </p:style>
+        <p:txBody>
+          <a:bodyPr rtlCol="0" anchor="ctr"/>
+          <a:lstStyle/>
+          <a:p>
+            <a:pPr algn="ctr"/>
+            <a:r>
+              <a:rPr lang="en-US" dirty="0"/>
+              <a:t>Custom Process Module 1</a:t>
+            </a:r>
+          </a:p>
+        </p:txBody>
+      </p:sp>
+      <p:sp>
+        <p:nvSpPr>
+          <p:cNvPr id="14" name="Rounded Rectangle 5">
+            <a:extLst>
+              <a:ext uri="{FF2B5EF4-FFF2-40B4-BE49-F238E27FC236}">
+                <a16:creationId xmlns:a16="http://schemas.microsoft.com/office/drawing/2014/main" id="{AC7AE688-9FA1-4E17-8726-8DE82A9C07BB}"/>
+              </a:ext>
+            </a:extLst>
+          </p:cNvPr>
+          <p:cNvSpPr/>
+          <p:nvPr/>
+        </p:nvSpPr>
+        <p:spPr>
+          <a:xfrm>
+            <a:off x="7492380" y="2675631"/>
+            <a:ext cx="1828800" cy="1695439"/>
+          </a:xfrm>
+          <a:prstGeom prst="roundRect">
+            <a:avLst/>
+          </a:prstGeom>
+          <a:solidFill>
+            <a:schemeClr val="tx2">
+              <a:lumMod val="50000"/>
+            </a:schemeClr>
+          </a:solidFill>
+          <a:ln w="28575">
+            <a:solidFill>
+              <a:schemeClr val="tx1"/>
+            </a:solidFill>
+          </a:ln>
+          <a:effectLst>
+            <a:outerShdw blurRad="50800" dist="38100" dir="2700000" algn="tl" rotWithShape="0">
+              <a:prstClr val="black">
+                <a:alpha val="40000"/>
+              </a:prstClr>
+            </a:outerShdw>
+          </a:effectLst>
+        </p:spPr>
+        <p:style>
+          <a:lnRef idx="1">
+            <a:schemeClr val="accent1"/>
+          </a:lnRef>
+          <a:fillRef idx="3">
+            <a:schemeClr val="accent1"/>
+          </a:fillRef>
+          <a:effectRef idx="2">
+            <a:schemeClr val="accent1"/>
+          </a:effectRef>
+          <a:fontRef idx="minor">
+            <a:schemeClr val="lt1"/>
+          </a:fontRef>
+        </p:style>
+        <p:txBody>
+          <a:bodyPr rtlCol="0" anchor="ctr"/>
+          <a:lstStyle/>
+          <a:p>
+            <a:pPr algn="ctr"/>
+            <a:r>
+              <a:rPr lang="en-US" dirty="0"/>
+              <a:t>Scan Engine Module</a:t>
+            </a:r>
+          </a:p>
+        </p:txBody>
+      </p:sp>
+      <p:sp>
+        <p:nvSpPr>
+          <p:cNvPr id="15" name="Rounded Rectangle 6">
+            <a:extLst>
+              <a:ext uri="{FF2B5EF4-FFF2-40B4-BE49-F238E27FC236}">
+                <a16:creationId xmlns:a16="http://schemas.microsoft.com/office/drawing/2014/main" id="{175EFA03-0F68-4E83-A963-597CBB5A67DF}"/>
+              </a:ext>
+            </a:extLst>
+          </p:cNvPr>
+          <p:cNvSpPr/>
+          <p:nvPr/>
+        </p:nvSpPr>
+        <p:spPr>
+          <a:xfrm>
+            <a:off x="2870819" y="1785104"/>
+            <a:ext cx="6450362" cy="771787"/>
           </a:xfrm>
           <a:prstGeom prst="roundRect">
             <a:avLst/>
@@ -11181,192 +12662,6 @@
             <a:pPr algn="ctr"/>
             <a:r>
               <a:rPr lang="en-US" dirty="0"/>
-              <a:t>Custom Input Module 1</a:t>
-            </a:r>
-          </a:p>
-        </p:txBody>
-      </p:sp>
-      <p:sp>
-        <p:nvSpPr>
-          <p:cNvPr id="13" name="Rounded Rectangle 4">
-            <a:extLst>
-              <a:ext uri="{FF2B5EF4-FFF2-40B4-BE49-F238E27FC236}">
-                <a16:creationId xmlns:a16="http://schemas.microsoft.com/office/drawing/2014/main" id="{DF97D33A-496D-415C-9003-D9090F872DE8}"/>
-              </a:ext>
-            </a:extLst>
-          </p:cNvPr>
-          <p:cNvSpPr/>
-          <p:nvPr/>
-        </p:nvSpPr>
-        <p:spPr>
-          <a:xfrm>
-            <a:off x="5240159" y="3249742"/>
-            <a:ext cx="1828800" cy="771787"/>
-          </a:xfrm>
-          <a:prstGeom prst="roundRect">
-            <a:avLst/>
-          </a:prstGeom>
-          <a:solidFill>
-            <a:srgbClr val="C00000"/>
-          </a:solidFill>
-          <a:ln w="28575">
-            <a:solidFill>
-              <a:schemeClr val="tx1"/>
-            </a:solidFill>
-          </a:ln>
-          <a:effectLst>
-            <a:outerShdw blurRad="50800" dist="38100" dir="2700000" algn="tl" rotWithShape="0">
-              <a:prstClr val="black">
-                <a:alpha val="40000"/>
-              </a:prstClr>
-            </a:outerShdw>
-          </a:effectLst>
-        </p:spPr>
-        <p:style>
-          <a:lnRef idx="1">
-            <a:schemeClr val="accent1"/>
-          </a:lnRef>
-          <a:fillRef idx="3">
-            <a:schemeClr val="accent1"/>
-          </a:fillRef>
-          <a:effectRef idx="2">
-            <a:schemeClr val="accent1"/>
-          </a:effectRef>
-          <a:fontRef idx="minor">
-            <a:schemeClr val="lt1"/>
-          </a:fontRef>
-        </p:style>
-        <p:txBody>
-          <a:bodyPr rtlCol="0" anchor="ctr"/>
-          <a:lstStyle/>
-          <a:p>
-            <a:pPr algn="ctr"/>
-            <a:r>
-              <a:rPr lang="en-US" dirty="0"/>
-              <a:t>Custom Process Module 1</a:t>
-            </a:r>
-          </a:p>
-        </p:txBody>
-      </p:sp>
-      <p:sp>
-        <p:nvSpPr>
-          <p:cNvPr id="14" name="Rounded Rectangle 5">
-            <a:extLst>
-              <a:ext uri="{FF2B5EF4-FFF2-40B4-BE49-F238E27FC236}">
-                <a16:creationId xmlns:a16="http://schemas.microsoft.com/office/drawing/2014/main" id="{AC7AE688-9FA1-4E17-8726-8DE82A9C07BB}"/>
-              </a:ext>
-            </a:extLst>
-          </p:cNvPr>
-          <p:cNvSpPr/>
-          <p:nvPr/>
-        </p:nvSpPr>
-        <p:spPr>
-          <a:xfrm>
-            <a:off x="7492380" y="3249740"/>
-            <a:ext cx="1828800" cy="1695439"/>
-          </a:xfrm>
-          <a:prstGeom prst="roundRect">
-            <a:avLst/>
-          </a:prstGeom>
-          <a:solidFill>
-            <a:srgbClr val="C00000"/>
-          </a:solidFill>
-          <a:ln w="28575">
-            <a:solidFill>
-              <a:schemeClr val="tx1"/>
-            </a:solidFill>
-          </a:ln>
-          <a:effectLst>
-            <a:outerShdw blurRad="50800" dist="38100" dir="2700000" algn="tl" rotWithShape="0">
-              <a:prstClr val="black">
-                <a:alpha val="40000"/>
-              </a:prstClr>
-            </a:outerShdw>
-          </a:effectLst>
-        </p:spPr>
-        <p:style>
-          <a:lnRef idx="1">
-            <a:schemeClr val="accent1"/>
-          </a:lnRef>
-          <a:fillRef idx="3">
-            <a:schemeClr val="accent1"/>
-          </a:fillRef>
-          <a:effectRef idx="2">
-            <a:schemeClr val="accent1"/>
-          </a:effectRef>
-          <a:fontRef idx="minor">
-            <a:schemeClr val="lt1"/>
-          </a:fontRef>
-        </p:style>
-        <p:txBody>
-          <a:bodyPr rtlCol="0" anchor="ctr"/>
-          <a:lstStyle/>
-          <a:p>
-            <a:pPr algn="ctr"/>
-            <a:r>
-              <a:rPr lang="en-US" dirty="0"/>
-              <a:t>Scan Engine Module</a:t>
-            </a:r>
-          </a:p>
-        </p:txBody>
-      </p:sp>
-      <p:sp>
-        <p:nvSpPr>
-          <p:cNvPr id="15" name="Rounded Rectangle 6">
-            <a:extLst>
-              <a:ext uri="{FF2B5EF4-FFF2-40B4-BE49-F238E27FC236}">
-                <a16:creationId xmlns:a16="http://schemas.microsoft.com/office/drawing/2014/main" id="{175EFA03-0F68-4E83-A963-597CBB5A67DF}"/>
-              </a:ext>
-            </a:extLst>
-          </p:cNvPr>
-          <p:cNvSpPr/>
-          <p:nvPr/>
-        </p:nvSpPr>
-        <p:spPr>
-          <a:xfrm>
-            <a:off x="2870819" y="2359213"/>
-            <a:ext cx="6450362" cy="771787"/>
-          </a:xfrm>
-          <a:prstGeom prst="roundRect">
-            <a:avLst/>
-          </a:prstGeom>
-          <a:solidFill>
-            <a:srgbClr val="007200"/>
-          </a:solidFill>
-          <a:ln w="28575">
-            <a:solidFill>
-              <a:schemeClr val="tx1"/>
-            </a:solidFill>
-          </a:ln>
-          <a:effectLst>
-            <a:outerShdw blurRad="50800" dist="38100" dir="2700000" algn="tl" rotWithShape="0">
-              <a:prstClr val="black">
-                <a:alpha val="40000"/>
-              </a:prstClr>
-            </a:outerShdw>
-          </a:effectLst>
-        </p:spPr>
-        <p:style>
-          <a:lnRef idx="1">
-            <a:schemeClr val="accent1"/>
-          </a:lnRef>
-          <a:fillRef idx="3">
-            <a:schemeClr val="accent1"/>
-          </a:fillRef>
-          <a:effectRef idx="2">
-            <a:schemeClr val="accent1"/>
-          </a:effectRef>
-          <a:fontRef idx="minor">
-            <a:schemeClr val="lt1"/>
-          </a:fontRef>
-        </p:style>
-        <p:txBody>
-          <a:bodyPr rtlCol="0" anchor="ctr"/>
-          <a:lstStyle/>
-          <a:p>
-            <a:pPr algn="ctr"/>
-            <a:r>
-              <a:rPr lang="en-US" dirty="0"/>
               <a:t>Engine</a:t>
             </a:r>
           </a:p>
@@ -11386,7 +12681,7 @@
         </p:nvSpPr>
         <p:spPr>
           <a:xfrm rot="5400000">
-            <a:off x="4998140" y="3299842"/>
+            <a:off x="4998140" y="2725733"/>
             <a:ext cx="251671" cy="680885"/>
           </a:xfrm>
           <a:prstGeom prst="upArrow">
@@ -11443,7 +12738,7 @@
         </p:nvSpPr>
         <p:spPr>
           <a:xfrm>
-            <a:off x="3015770" y="5428244"/>
+            <a:off x="3015770" y="4854135"/>
             <a:ext cx="1373453" cy="839972"/>
           </a:xfrm>
           <a:prstGeom prst="cloud">
@@ -11501,7 +12796,7 @@
         </p:nvSpPr>
         <p:spPr>
           <a:xfrm>
-            <a:off x="7802777" y="5428244"/>
+            <a:off x="7802777" y="4854135"/>
             <a:ext cx="1373453" cy="839972"/>
           </a:xfrm>
           <a:prstGeom prst="cloud">
@@ -11559,7 +12854,7 @@
         </p:nvSpPr>
         <p:spPr>
           <a:xfrm rot="10800000">
-            <a:off x="8328008" y="4945178"/>
+            <a:off x="8328008" y="4371069"/>
             <a:ext cx="251671" cy="680885"/>
           </a:xfrm>
           <a:prstGeom prst="upArrow">
@@ -11618,7 +12913,7 @@
         </p:nvSpPr>
         <p:spPr>
           <a:xfrm rot="5400000">
-            <a:off x="7283566" y="3295192"/>
+            <a:off x="7283566" y="2721083"/>
             <a:ext cx="251671" cy="680885"/>
           </a:xfrm>
           <a:prstGeom prst="upArrow">
@@ -11675,14 +12970,16 @@
         </p:nvSpPr>
         <p:spPr>
           <a:xfrm>
-            <a:off x="2870818" y="4182757"/>
+            <a:off x="2870818" y="3608648"/>
             <a:ext cx="1828800" cy="771787"/>
           </a:xfrm>
           <a:prstGeom prst="roundRect">
             <a:avLst/>
           </a:prstGeom>
           <a:solidFill>
-            <a:srgbClr val="C00000"/>
+            <a:schemeClr val="tx2">
+              <a:lumMod val="50000"/>
+            </a:schemeClr>
           </a:solidFill>
           <a:ln w="28575">
             <a:solidFill>
@@ -11737,14 +13034,16 @@
         </p:nvSpPr>
         <p:spPr>
           <a:xfrm>
-            <a:off x="5239572" y="4173392"/>
+            <a:off x="5239572" y="3599283"/>
             <a:ext cx="1828800" cy="771787"/>
           </a:xfrm>
           <a:prstGeom prst="roundRect">
             <a:avLst/>
           </a:prstGeom>
           <a:solidFill>
-            <a:srgbClr val="C00000"/>
+            <a:schemeClr val="accent6">
+              <a:lumMod val="75000"/>
+            </a:schemeClr>
           </a:solidFill>
           <a:ln w="28575">
             <a:solidFill>
@@ -11799,7 +13098,7 @@
         </p:nvSpPr>
         <p:spPr>
           <a:xfrm rot="5400000">
-            <a:off x="4957510" y="4236985"/>
+            <a:off x="4957510" y="3662876"/>
             <a:ext cx="251671" cy="680885"/>
           </a:xfrm>
           <a:prstGeom prst="upArrow">
@@ -11856,7 +13155,7 @@
         </p:nvSpPr>
         <p:spPr>
           <a:xfrm rot="5400000">
-            <a:off x="7283566" y="4246210"/>
+            <a:off x="7283566" y="3672101"/>
             <a:ext cx="251671" cy="680885"/>
           </a:xfrm>
           <a:prstGeom prst="upArrow">
@@ -11913,7 +13212,7 @@
         </p:nvSpPr>
         <p:spPr>
           <a:xfrm>
-            <a:off x="3576662" y="4945179"/>
+            <a:off x="3576662" y="4371070"/>
             <a:ext cx="251671" cy="680885"/>
           </a:xfrm>
           <a:prstGeom prst="upArrow">

</xml_diff>